<commit_message>
add exploratory analyses done during weight-at-size day
</commit_message>
<xml_diff>
--- a/figures/weight at size diagram.pptx
+++ b/figures/weight at size diagram.pptx
@@ -5,7 +5,8 @@
     <p:sldMasterId id="2147483648" r:id="rId1"/>
   </p:sldMasterIdLst>
   <p:sldIdLst>
-    <p:sldId id="337" r:id="rId2"/>
+    <p:sldId id="338" r:id="rId2"/>
+    <p:sldId id="337" r:id="rId3"/>
   </p:sldIdLst>
   <p:sldSz cx="12192000" cy="6858000"/>
   <p:notesSz cx="6858000" cy="9144000"/>
@@ -259,7 +260,7 @@
           <a:p>
             <a:fld id="{79BF02A8-7D7E-4754-85D6-23CB0DCEC424}" type="datetimeFigureOut">
               <a:rPr lang="en-US" smtClean="0"/>
-              <a:t>5/10/2024</a:t>
+              <a:t>6/6/2024</a:t>
             </a:fld>
             <a:endParaRPr lang="en-US"/>
           </a:p>
@@ -457,7 +458,7 @@
           <a:p>
             <a:fld id="{79BF02A8-7D7E-4754-85D6-23CB0DCEC424}" type="datetimeFigureOut">
               <a:rPr lang="en-US" smtClean="0"/>
-              <a:t>5/10/2024</a:t>
+              <a:t>6/6/2024</a:t>
             </a:fld>
             <a:endParaRPr lang="en-US"/>
           </a:p>
@@ -665,7 +666,7 @@
           <a:p>
             <a:fld id="{79BF02A8-7D7E-4754-85D6-23CB0DCEC424}" type="datetimeFigureOut">
               <a:rPr lang="en-US" smtClean="0"/>
-              <a:t>5/10/2024</a:t>
+              <a:t>6/6/2024</a:t>
             </a:fld>
             <a:endParaRPr lang="en-US"/>
           </a:p>
@@ -863,7 +864,7 @@
           <a:p>
             <a:fld id="{79BF02A8-7D7E-4754-85D6-23CB0DCEC424}" type="datetimeFigureOut">
               <a:rPr lang="en-US" smtClean="0"/>
-              <a:t>5/10/2024</a:t>
+              <a:t>6/6/2024</a:t>
             </a:fld>
             <a:endParaRPr lang="en-US"/>
           </a:p>
@@ -1138,7 +1139,7 @@
           <a:p>
             <a:fld id="{79BF02A8-7D7E-4754-85D6-23CB0DCEC424}" type="datetimeFigureOut">
               <a:rPr lang="en-US" smtClean="0"/>
-              <a:t>5/10/2024</a:t>
+              <a:t>6/6/2024</a:t>
             </a:fld>
             <a:endParaRPr lang="en-US"/>
           </a:p>
@@ -1403,7 +1404,7 @@
           <a:p>
             <a:fld id="{79BF02A8-7D7E-4754-85D6-23CB0DCEC424}" type="datetimeFigureOut">
               <a:rPr lang="en-US" smtClean="0"/>
-              <a:t>5/10/2024</a:t>
+              <a:t>6/6/2024</a:t>
             </a:fld>
             <a:endParaRPr lang="en-US"/>
           </a:p>
@@ -1815,7 +1816,7 @@
           <a:p>
             <a:fld id="{79BF02A8-7D7E-4754-85D6-23CB0DCEC424}" type="datetimeFigureOut">
               <a:rPr lang="en-US" smtClean="0"/>
-              <a:t>5/10/2024</a:t>
+              <a:t>6/6/2024</a:t>
             </a:fld>
             <a:endParaRPr lang="en-US"/>
           </a:p>
@@ -1956,7 +1957,7 @@
           <a:p>
             <a:fld id="{79BF02A8-7D7E-4754-85D6-23CB0DCEC424}" type="datetimeFigureOut">
               <a:rPr lang="en-US" smtClean="0"/>
-              <a:t>5/10/2024</a:t>
+              <a:t>6/6/2024</a:t>
             </a:fld>
             <a:endParaRPr lang="en-US"/>
           </a:p>
@@ -2069,7 +2070,7 @@
           <a:p>
             <a:fld id="{79BF02A8-7D7E-4754-85D6-23CB0DCEC424}" type="datetimeFigureOut">
               <a:rPr lang="en-US" smtClean="0"/>
-              <a:t>5/10/2024</a:t>
+              <a:t>6/6/2024</a:t>
             </a:fld>
             <a:endParaRPr lang="en-US"/>
           </a:p>
@@ -2380,7 +2381,7 @@
           <a:p>
             <a:fld id="{79BF02A8-7D7E-4754-85D6-23CB0DCEC424}" type="datetimeFigureOut">
               <a:rPr lang="en-US" smtClean="0"/>
-              <a:t>5/10/2024</a:t>
+              <a:t>6/6/2024</a:t>
             </a:fld>
             <a:endParaRPr lang="en-US"/>
           </a:p>
@@ -2668,7 +2669,7 @@
           <a:p>
             <a:fld id="{79BF02A8-7D7E-4754-85D6-23CB0DCEC424}" type="datetimeFigureOut">
               <a:rPr lang="en-US" smtClean="0"/>
-              <a:t>5/10/2024</a:t>
+              <a:t>6/6/2024</a:t>
             </a:fld>
             <a:endParaRPr lang="en-US"/>
           </a:p>
@@ -2909,7 +2910,7 @@
           <a:p>
             <a:fld id="{79BF02A8-7D7E-4754-85D6-23CB0DCEC424}" type="datetimeFigureOut">
               <a:rPr lang="en-US" smtClean="0"/>
-              <a:t>5/10/2024</a:t>
+              <a:t>6/6/2024</a:t>
             </a:fld>
             <a:endParaRPr lang="en-US"/>
           </a:p>
@@ -3328,6 +3329,108 @@
       </p:grpSpPr>
       <p:sp>
         <p:nvSpPr>
+          <p:cNvPr id="298" name="Rectangle 297">
+            <a:extLst>
+              <a:ext uri="{FF2B5EF4-FFF2-40B4-BE49-F238E27FC236}">
+                <a16:creationId xmlns:a16="http://schemas.microsoft.com/office/drawing/2014/main" id="{C727A8C7-4004-A018-15A4-927901445235}"/>
+              </a:ext>
+            </a:extLst>
+          </p:cNvPr>
+          <p:cNvSpPr/>
+          <p:nvPr/>
+        </p:nvSpPr>
+        <p:spPr>
+          <a:xfrm>
+            <a:off x="3778968" y="2266188"/>
+            <a:ext cx="1451174" cy="1792498"/>
+          </a:xfrm>
+          <a:prstGeom prst="rect">
+            <a:avLst/>
+          </a:prstGeom>
+          <a:solidFill>
+            <a:srgbClr val="C5E0B4">
+              <a:alpha val="26000"/>
+            </a:srgbClr>
+          </a:solidFill>
+        </p:spPr>
+        <p:style>
+          <a:lnRef idx="2">
+            <a:schemeClr val="accent1">
+              <a:shade val="15000"/>
+            </a:schemeClr>
+          </a:lnRef>
+          <a:fillRef idx="1">
+            <a:schemeClr val="accent1"/>
+          </a:fillRef>
+          <a:effectRef idx="0">
+            <a:schemeClr val="accent1"/>
+          </a:effectRef>
+          <a:fontRef idx="minor">
+            <a:schemeClr val="lt1"/>
+          </a:fontRef>
+        </p:style>
+        <p:txBody>
+          <a:bodyPr rtlCol="0" anchor="ctr"/>
+          <a:lstStyle/>
+          <a:p>
+            <a:pPr algn="ctr"/>
+            <a:endParaRPr lang="en-US"/>
+          </a:p>
+        </p:txBody>
+      </p:sp>
+      <p:sp>
+        <p:nvSpPr>
+          <p:cNvPr id="297" name="Rectangle 296">
+            <a:extLst>
+              <a:ext uri="{FF2B5EF4-FFF2-40B4-BE49-F238E27FC236}">
+                <a16:creationId xmlns:a16="http://schemas.microsoft.com/office/drawing/2014/main" id="{39579F7F-0EB3-D0F7-C381-7239A0079B6F}"/>
+              </a:ext>
+            </a:extLst>
+          </p:cNvPr>
+          <p:cNvSpPr/>
+          <p:nvPr/>
+        </p:nvSpPr>
+        <p:spPr>
+          <a:xfrm>
+            <a:off x="7097297" y="2260312"/>
+            <a:ext cx="1802612" cy="1729637"/>
+          </a:xfrm>
+          <a:prstGeom prst="rect">
+            <a:avLst/>
+          </a:prstGeom>
+          <a:solidFill>
+            <a:srgbClr val="FFF2CC">
+              <a:alpha val="33000"/>
+            </a:srgbClr>
+          </a:solidFill>
+        </p:spPr>
+        <p:style>
+          <a:lnRef idx="2">
+            <a:schemeClr val="accent1">
+              <a:shade val="15000"/>
+            </a:schemeClr>
+          </a:lnRef>
+          <a:fillRef idx="1">
+            <a:schemeClr val="accent1"/>
+          </a:fillRef>
+          <a:effectRef idx="0">
+            <a:schemeClr val="accent1"/>
+          </a:effectRef>
+          <a:fontRef idx="minor">
+            <a:schemeClr val="lt1"/>
+          </a:fontRef>
+        </p:style>
+        <p:txBody>
+          <a:bodyPr rtlCol="0" anchor="ctr"/>
+          <a:lstStyle/>
+          <a:p>
+            <a:pPr algn="ctr"/>
+            <a:endParaRPr lang="en-US"/>
+          </a:p>
+        </p:txBody>
+      </p:sp>
+      <p:sp>
+        <p:nvSpPr>
           <p:cNvPr id="136" name="TextBox 135">
             <a:extLst>
               <a:ext uri="{FF2B5EF4-FFF2-40B4-BE49-F238E27FC236}">
@@ -3363,10 +3466,10 @@
       </p:sp>
       <p:sp>
         <p:nvSpPr>
-          <p:cNvPr id="22" name="TextBox 21">
-            <a:extLst>
-              <a:ext uri="{FF2B5EF4-FFF2-40B4-BE49-F238E27FC236}">
-                <a16:creationId xmlns:a16="http://schemas.microsoft.com/office/drawing/2014/main" id="{725F8171-B8BA-1939-8354-5A182941F297}"/>
+          <p:cNvPr id="6" name="TextBox 5">
+            <a:extLst>
+              <a:ext uri="{FF2B5EF4-FFF2-40B4-BE49-F238E27FC236}">
+                <a16:creationId xmlns:a16="http://schemas.microsoft.com/office/drawing/2014/main" id="{66D2EE54-C9E3-6ACB-EDA5-228E68A9D94A}"/>
               </a:ext>
             </a:extLst>
           </p:cNvPr>
@@ -3375,8 +3478,612 @@
         </p:nvSpPr>
         <p:spPr>
           <a:xfrm>
-            <a:off x="506167" y="1208607"/>
-            <a:ext cx="1730100" cy="646331"/>
+            <a:off x="7263807" y="3251061"/>
+            <a:ext cx="1543573" cy="646331"/>
+          </a:xfrm>
+          <a:prstGeom prst="rect">
+            <a:avLst/>
+          </a:prstGeom>
+          <a:solidFill>
+            <a:schemeClr val="accent4">
+              <a:lumMod val="20000"/>
+              <a:lumOff val="80000"/>
+            </a:schemeClr>
+          </a:solidFill>
+          <a:ln w="19050">
+            <a:solidFill>
+              <a:schemeClr val="bg2">
+                <a:lumMod val="25000"/>
+              </a:schemeClr>
+            </a:solidFill>
+          </a:ln>
+        </p:spPr>
+        <p:txBody>
+          <a:bodyPr wrap="square" rtlCol="0">
+            <a:spAutoFit/>
+          </a:bodyPr>
+          <a:lstStyle/>
+          <a:p>
+            <a:pPr algn="ctr"/>
+            <a:r>
+              <a:rPr lang="en-CA" dirty="0"/>
+              <a:t>Observed weight</a:t>
+            </a:r>
+            <a:endParaRPr lang="en-US" dirty="0"/>
+          </a:p>
+        </p:txBody>
+      </p:sp>
+      <p:sp>
+        <p:nvSpPr>
+          <p:cNvPr id="7" name="TextBox 6">
+            <a:extLst>
+              <a:ext uri="{FF2B5EF4-FFF2-40B4-BE49-F238E27FC236}">
+                <a16:creationId xmlns:a16="http://schemas.microsoft.com/office/drawing/2014/main" id="{66D899FF-E46B-4C4C-F564-CDB242385069}"/>
+              </a:ext>
+            </a:extLst>
+          </p:cNvPr>
+          <p:cNvSpPr txBox="1"/>
+          <p:nvPr/>
+        </p:nvSpPr>
+        <p:spPr>
+          <a:xfrm>
+            <a:off x="3867827" y="3276808"/>
+            <a:ext cx="1255594" cy="646331"/>
+          </a:xfrm>
+          <a:prstGeom prst="rect">
+            <a:avLst/>
+          </a:prstGeom>
+          <a:solidFill>
+            <a:schemeClr val="accent6">
+              <a:lumMod val="40000"/>
+              <a:lumOff val="60000"/>
+            </a:schemeClr>
+          </a:solidFill>
+          <a:ln w="19050">
+            <a:solidFill>
+              <a:schemeClr val="bg2">
+                <a:lumMod val="25000"/>
+              </a:schemeClr>
+            </a:solidFill>
+          </a:ln>
+        </p:spPr>
+        <p:txBody>
+          <a:bodyPr wrap="square" rtlCol="0">
+            <a:spAutoFit/>
+          </a:bodyPr>
+          <a:lstStyle/>
+          <a:p>
+            <a:pPr algn="ctr"/>
+            <a:r>
+              <a:rPr lang="en-CA" dirty="0"/>
+              <a:t>True weight</a:t>
+            </a:r>
+            <a:endParaRPr lang="en-US" dirty="0"/>
+          </a:p>
+        </p:txBody>
+      </p:sp>
+      <p:sp>
+        <p:nvSpPr>
+          <p:cNvPr id="31" name="TextBox 30">
+            <a:extLst>
+              <a:ext uri="{FF2B5EF4-FFF2-40B4-BE49-F238E27FC236}">
+                <a16:creationId xmlns:a16="http://schemas.microsoft.com/office/drawing/2014/main" id="{E6B6F01B-8F36-5C5B-7DFF-9286FFACB9B3}"/>
+              </a:ext>
+            </a:extLst>
+          </p:cNvPr>
+          <p:cNvSpPr txBox="1"/>
+          <p:nvPr/>
+        </p:nvSpPr>
+        <p:spPr>
+          <a:xfrm>
+            <a:off x="4026621" y="2439039"/>
+            <a:ext cx="975952" cy="646331"/>
+          </a:xfrm>
+          <a:prstGeom prst="rect">
+            <a:avLst/>
+          </a:prstGeom>
+          <a:solidFill>
+            <a:srgbClr val="C5E0B4"/>
+          </a:solidFill>
+          <a:ln w="19050">
+            <a:solidFill>
+              <a:schemeClr val="bg2">
+                <a:lumMod val="25000"/>
+              </a:schemeClr>
+            </a:solidFill>
+          </a:ln>
+        </p:spPr>
+        <p:txBody>
+          <a:bodyPr wrap="square" rtlCol="0">
+            <a:spAutoFit/>
+          </a:bodyPr>
+          <a:lstStyle/>
+          <a:p>
+            <a:pPr algn="ctr"/>
+            <a:r>
+              <a:rPr lang="en-CA" dirty="0"/>
+              <a:t>True size</a:t>
+            </a:r>
+            <a:endParaRPr lang="en-US" dirty="0"/>
+          </a:p>
+        </p:txBody>
+      </p:sp>
+      <p:sp>
+        <p:nvSpPr>
+          <p:cNvPr id="51" name="TextBox 50">
+            <a:extLst>
+              <a:ext uri="{FF2B5EF4-FFF2-40B4-BE49-F238E27FC236}">
+                <a16:creationId xmlns:a16="http://schemas.microsoft.com/office/drawing/2014/main" id="{78A80040-1A25-9E7B-7613-FB60C487818D}"/>
+              </a:ext>
+            </a:extLst>
+          </p:cNvPr>
+          <p:cNvSpPr txBox="1"/>
+          <p:nvPr/>
+        </p:nvSpPr>
+        <p:spPr>
+          <a:xfrm>
+            <a:off x="3123330" y="4789284"/>
+            <a:ext cx="1255594" cy="369332"/>
+          </a:xfrm>
+          <a:prstGeom prst="rect">
+            <a:avLst/>
+          </a:prstGeom>
+          <a:solidFill>
+            <a:schemeClr val="accent1">
+              <a:lumMod val="20000"/>
+              <a:lumOff val="80000"/>
+            </a:schemeClr>
+          </a:solidFill>
+          <a:ln>
+            <a:solidFill>
+              <a:schemeClr val="bg2">
+                <a:lumMod val="25000"/>
+              </a:schemeClr>
+            </a:solidFill>
+          </a:ln>
+        </p:spPr>
+        <p:txBody>
+          <a:bodyPr wrap="square" rtlCol="0">
+            <a:spAutoFit/>
+          </a:bodyPr>
+          <a:lstStyle/>
+          <a:p>
+            <a:pPr algn="ctr"/>
+            <a:r>
+              <a:rPr lang="en-CA" dirty="0"/>
+              <a:t>Disease</a:t>
+            </a:r>
+            <a:endParaRPr lang="en-US" dirty="0"/>
+          </a:p>
+        </p:txBody>
+      </p:sp>
+      <p:sp>
+        <p:nvSpPr>
+          <p:cNvPr id="52" name="TextBox 51">
+            <a:extLst>
+              <a:ext uri="{FF2B5EF4-FFF2-40B4-BE49-F238E27FC236}">
+                <a16:creationId xmlns:a16="http://schemas.microsoft.com/office/drawing/2014/main" id="{2A125DB6-35AB-031A-1DDB-BE3284CB6188}"/>
+              </a:ext>
+            </a:extLst>
+          </p:cNvPr>
+          <p:cNvSpPr txBox="1"/>
+          <p:nvPr/>
+        </p:nvSpPr>
+        <p:spPr>
+          <a:xfrm>
+            <a:off x="2459560" y="3844097"/>
+            <a:ext cx="1255594" cy="646331"/>
+          </a:xfrm>
+          <a:prstGeom prst="rect">
+            <a:avLst/>
+          </a:prstGeom>
+          <a:solidFill>
+            <a:schemeClr val="accent1">
+              <a:lumMod val="20000"/>
+              <a:lumOff val="80000"/>
+            </a:schemeClr>
+          </a:solidFill>
+          <a:ln>
+            <a:solidFill>
+              <a:schemeClr val="bg2">
+                <a:lumMod val="25000"/>
+              </a:schemeClr>
+            </a:solidFill>
+          </a:ln>
+        </p:spPr>
+        <p:txBody>
+          <a:bodyPr wrap="square" rtlCol="0">
+            <a:spAutoFit/>
+          </a:bodyPr>
+          <a:lstStyle/>
+          <a:p>
+            <a:pPr algn="ctr"/>
+            <a:r>
+              <a:rPr lang="en-CA" dirty="0"/>
+              <a:t>Health Condition</a:t>
+            </a:r>
+            <a:endParaRPr lang="en-US" dirty="0"/>
+          </a:p>
+        </p:txBody>
+      </p:sp>
+      <p:sp>
+        <p:nvSpPr>
+          <p:cNvPr id="53" name="TextBox 52">
+            <a:extLst>
+              <a:ext uri="{FF2B5EF4-FFF2-40B4-BE49-F238E27FC236}">
+                <a16:creationId xmlns:a16="http://schemas.microsoft.com/office/drawing/2014/main" id="{8C213A89-C677-95D2-4F22-86C512369243}"/>
+              </a:ext>
+            </a:extLst>
+          </p:cNvPr>
+          <p:cNvSpPr txBox="1"/>
+          <p:nvPr/>
+        </p:nvSpPr>
+        <p:spPr>
+          <a:xfrm>
+            <a:off x="1670863" y="4789284"/>
+            <a:ext cx="1255594" cy="369332"/>
+          </a:xfrm>
+          <a:prstGeom prst="rect">
+            <a:avLst/>
+          </a:prstGeom>
+          <a:solidFill>
+            <a:schemeClr val="accent1">
+              <a:lumMod val="20000"/>
+              <a:lumOff val="80000"/>
+            </a:schemeClr>
+          </a:solidFill>
+          <a:ln>
+            <a:solidFill>
+              <a:schemeClr val="bg2">
+                <a:lumMod val="25000"/>
+              </a:schemeClr>
+            </a:solidFill>
+          </a:ln>
+        </p:spPr>
+        <p:txBody>
+          <a:bodyPr wrap="square" rtlCol="0">
+            <a:spAutoFit/>
+          </a:bodyPr>
+          <a:lstStyle/>
+          <a:p>
+            <a:pPr algn="ctr"/>
+            <a:r>
+              <a:rPr lang="en-CA" dirty="0"/>
+              <a:t>Food</a:t>
+            </a:r>
+            <a:endParaRPr lang="en-US" dirty="0"/>
+          </a:p>
+        </p:txBody>
+      </p:sp>
+      <p:cxnSp>
+        <p:nvCxnSpPr>
+          <p:cNvPr id="54" name="Straight Arrow Connector 53">
+            <a:extLst>
+              <a:ext uri="{FF2B5EF4-FFF2-40B4-BE49-F238E27FC236}">
+                <a16:creationId xmlns:a16="http://schemas.microsoft.com/office/drawing/2014/main" id="{BB2EDBE4-888C-B516-3C53-65625BE2C6F7}"/>
+              </a:ext>
+            </a:extLst>
+          </p:cNvPr>
+          <p:cNvCxnSpPr>
+            <a:cxnSpLocks/>
+            <a:stCxn id="53" idx="0"/>
+            <a:endCxn id="52" idx="2"/>
+          </p:cNvCxnSpPr>
+          <p:nvPr/>
+        </p:nvCxnSpPr>
+        <p:spPr>
+          <a:xfrm flipV="1">
+            <a:off x="2298660" y="4490428"/>
+            <a:ext cx="788697" cy="298856"/>
+          </a:xfrm>
+          <a:prstGeom prst="straightConnector1">
+            <a:avLst/>
+          </a:prstGeom>
+          <a:ln w="15875">
+            <a:tailEnd type="triangle" w="lg" len="lg"/>
+          </a:ln>
+        </p:spPr>
+        <p:style>
+          <a:lnRef idx="2">
+            <a:schemeClr val="dk1"/>
+          </a:lnRef>
+          <a:fillRef idx="0">
+            <a:schemeClr val="dk1"/>
+          </a:fillRef>
+          <a:effectRef idx="1">
+            <a:schemeClr val="dk1"/>
+          </a:effectRef>
+          <a:fontRef idx="minor">
+            <a:schemeClr val="tx1"/>
+          </a:fontRef>
+        </p:style>
+      </p:cxnSp>
+      <p:cxnSp>
+        <p:nvCxnSpPr>
+          <p:cNvPr id="57" name="Straight Arrow Connector 56">
+            <a:extLst>
+              <a:ext uri="{FF2B5EF4-FFF2-40B4-BE49-F238E27FC236}">
+                <a16:creationId xmlns:a16="http://schemas.microsoft.com/office/drawing/2014/main" id="{C0626B02-C201-B73B-10DF-85F16A3052A9}"/>
+              </a:ext>
+            </a:extLst>
+          </p:cNvPr>
+          <p:cNvCxnSpPr>
+            <a:cxnSpLocks/>
+            <a:stCxn id="51" idx="0"/>
+            <a:endCxn id="52" idx="2"/>
+          </p:cNvCxnSpPr>
+          <p:nvPr/>
+        </p:nvCxnSpPr>
+        <p:spPr>
+          <a:xfrm flipH="1" flipV="1">
+            <a:off x="3087357" y="4490428"/>
+            <a:ext cx="663770" cy="298856"/>
+          </a:xfrm>
+          <a:prstGeom prst="straightConnector1">
+            <a:avLst/>
+          </a:prstGeom>
+          <a:ln w="15875">
+            <a:tailEnd type="triangle" w="lg" len="lg"/>
+          </a:ln>
+        </p:spPr>
+        <p:style>
+          <a:lnRef idx="2">
+            <a:schemeClr val="dk1"/>
+          </a:lnRef>
+          <a:fillRef idx="0">
+            <a:schemeClr val="dk1"/>
+          </a:fillRef>
+          <a:effectRef idx="1">
+            <a:schemeClr val="dk1"/>
+          </a:effectRef>
+          <a:fontRef idx="minor">
+            <a:schemeClr val="tx1"/>
+          </a:fontRef>
+        </p:style>
+      </p:cxnSp>
+      <p:cxnSp>
+        <p:nvCxnSpPr>
+          <p:cNvPr id="73" name="Straight Arrow Connector 72">
+            <a:extLst>
+              <a:ext uri="{FF2B5EF4-FFF2-40B4-BE49-F238E27FC236}">
+                <a16:creationId xmlns:a16="http://schemas.microsoft.com/office/drawing/2014/main" id="{2CD9F0FA-36A9-084D-EB4D-5E4D7D0AE4A8}"/>
+              </a:ext>
+            </a:extLst>
+          </p:cNvPr>
+          <p:cNvCxnSpPr>
+            <a:cxnSpLocks/>
+            <a:stCxn id="52" idx="0"/>
+            <a:endCxn id="7" idx="1"/>
+          </p:cNvCxnSpPr>
+          <p:nvPr/>
+        </p:nvCxnSpPr>
+        <p:spPr>
+          <a:xfrm flipV="1">
+            <a:off x="3087357" y="3599974"/>
+            <a:ext cx="780470" cy="244123"/>
+          </a:xfrm>
+          <a:prstGeom prst="straightConnector1">
+            <a:avLst/>
+          </a:prstGeom>
+          <a:ln w="15875">
+            <a:tailEnd type="triangle" w="lg" len="lg"/>
+          </a:ln>
+        </p:spPr>
+        <p:style>
+          <a:lnRef idx="2">
+            <a:schemeClr val="dk1"/>
+          </a:lnRef>
+          <a:fillRef idx="0">
+            <a:schemeClr val="dk1"/>
+          </a:fillRef>
+          <a:effectRef idx="1">
+            <a:schemeClr val="dk1"/>
+          </a:effectRef>
+          <a:fontRef idx="minor">
+            <a:schemeClr val="tx1"/>
+          </a:fontRef>
+        </p:style>
+      </p:cxnSp>
+      <p:sp>
+        <p:nvSpPr>
+          <p:cNvPr id="165" name="TextBox 164">
+            <a:extLst>
+              <a:ext uri="{FF2B5EF4-FFF2-40B4-BE49-F238E27FC236}">
+                <a16:creationId xmlns:a16="http://schemas.microsoft.com/office/drawing/2014/main" id="{892BB7A8-3637-53C8-832E-E51042C1473A}"/>
+              </a:ext>
+            </a:extLst>
+          </p:cNvPr>
+          <p:cNvSpPr txBox="1"/>
+          <p:nvPr/>
+        </p:nvSpPr>
+        <p:spPr>
+          <a:xfrm>
+            <a:off x="7417659" y="4781353"/>
+            <a:ext cx="1255594" cy="646331"/>
+          </a:xfrm>
+          <a:prstGeom prst="rect">
+            <a:avLst/>
+          </a:prstGeom>
+          <a:solidFill>
+            <a:schemeClr val="accent1">
+              <a:lumMod val="20000"/>
+              <a:lumOff val="80000"/>
+            </a:schemeClr>
+          </a:solidFill>
+          <a:ln>
+            <a:solidFill>
+              <a:schemeClr val="bg2">
+                <a:lumMod val="25000"/>
+              </a:schemeClr>
+            </a:solidFill>
+          </a:ln>
+        </p:spPr>
+        <p:txBody>
+          <a:bodyPr wrap="square" rtlCol="0">
+            <a:spAutoFit/>
+          </a:bodyPr>
+          <a:lstStyle/>
+          <a:p>
+            <a:pPr algn="ctr"/>
+            <a:r>
+              <a:rPr lang="en-CA" dirty="0"/>
+              <a:t>Sea conditions</a:t>
+            </a:r>
+            <a:endParaRPr lang="en-US" dirty="0"/>
+          </a:p>
+        </p:txBody>
+      </p:sp>
+      <p:sp>
+        <p:nvSpPr>
+          <p:cNvPr id="166" name="TextBox 165">
+            <a:extLst>
+              <a:ext uri="{FF2B5EF4-FFF2-40B4-BE49-F238E27FC236}">
+                <a16:creationId xmlns:a16="http://schemas.microsoft.com/office/drawing/2014/main" id="{30DCC95E-0F0A-8B27-D036-E883DB276209}"/>
+              </a:ext>
+            </a:extLst>
+          </p:cNvPr>
+          <p:cNvSpPr txBox="1"/>
+          <p:nvPr/>
+        </p:nvSpPr>
+        <p:spPr>
+          <a:xfrm>
+            <a:off x="7110692" y="4156422"/>
+            <a:ext cx="1869527" cy="369332"/>
+          </a:xfrm>
+          <a:prstGeom prst="rect">
+            <a:avLst/>
+          </a:prstGeom>
+          <a:solidFill>
+            <a:schemeClr val="accent1">
+              <a:lumMod val="20000"/>
+              <a:lumOff val="80000"/>
+            </a:schemeClr>
+          </a:solidFill>
+          <a:ln>
+            <a:solidFill>
+              <a:schemeClr val="bg2">
+                <a:lumMod val="25000"/>
+              </a:schemeClr>
+            </a:solidFill>
+          </a:ln>
+        </p:spPr>
+        <p:txBody>
+          <a:bodyPr wrap="square" rtlCol="0">
+            <a:spAutoFit/>
+          </a:bodyPr>
+          <a:lstStyle/>
+          <a:p>
+            <a:pPr algn="ctr"/>
+            <a:r>
+              <a:rPr lang="en-CA" dirty="0"/>
+              <a:t>Weight precision</a:t>
+            </a:r>
+            <a:endParaRPr lang="en-US" dirty="0"/>
+          </a:p>
+        </p:txBody>
+      </p:sp>
+      <p:cxnSp>
+        <p:nvCxnSpPr>
+          <p:cNvPr id="167" name="Straight Arrow Connector 166">
+            <a:extLst>
+              <a:ext uri="{FF2B5EF4-FFF2-40B4-BE49-F238E27FC236}">
+                <a16:creationId xmlns:a16="http://schemas.microsoft.com/office/drawing/2014/main" id="{7065B2D9-6F22-52BC-4082-046E22CA4374}"/>
+              </a:ext>
+            </a:extLst>
+          </p:cNvPr>
+          <p:cNvCxnSpPr>
+            <a:cxnSpLocks/>
+            <a:stCxn id="165" idx="0"/>
+            <a:endCxn id="166" idx="2"/>
+          </p:cNvCxnSpPr>
+          <p:nvPr/>
+        </p:nvCxnSpPr>
+        <p:spPr>
+          <a:xfrm flipV="1">
+            <a:off x="8045456" y="4525754"/>
+            <a:ext cx="0" cy="255599"/>
+          </a:xfrm>
+          <a:prstGeom prst="straightConnector1">
+            <a:avLst/>
+          </a:prstGeom>
+          <a:ln w="15875">
+            <a:tailEnd type="triangle" w="lg" len="lg"/>
+          </a:ln>
+        </p:spPr>
+        <p:style>
+          <a:lnRef idx="2">
+            <a:schemeClr val="dk1"/>
+          </a:lnRef>
+          <a:fillRef idx="0">
+            <a:schemeClr val="dk1"/>
+          </a:fillRef>
+          <a:effectRef idx="1">
+            <a:schemeClr val="dk1"/>
+          </a:effectRef>
+          <a:fontRef idx="minor">
+            <a:schemeClr val="tx1"/>
+          </a:fontRef>
+        </p:style>
+      </p:cxnSp>
+      <p:cxnSp>
+        <p:nvCxnSpPr>
+          <p:cNvPr id="170" name="Straight Arrow Connector 169">
+            <a:extLst>
+              <a:ext uri="{FF2B5EF4-FFF2-40B4-BE49-F238E27FC236}">
+                <a16:creationId xmlns:a16="http://schemas.microsoft.com/office/drawing/2014/main" id="{6DD3B0E9-A070-5740-2D57-2CDE78F1FCAC}"/>
+              </a:ext>
+            </a:extLst>
+          </p:cNvPr>
+          <p:cNvCxnSpPr>
+            <a:cxnSpLocks/>
+            <a:stCxn id="166" idx="0"/>
+            <a:endCxn id="6" idx="2"/>
+          </p:cNvCxnSpPr>
+          <p:nvPr/>
+        </p:nvCxnSpPr>
+        <p:spPr>
+          <a:xfrm flipH="1" flipV="1">
+            <a:off x="8035594" y="3897392"/>
+            <a:ext cx="9862" cy="259030"/>
+          </a:xfrm>
+          <a:prstGeom prst="straightConnector1">
+            <a:avLst/>
+          </a:prstGeom>
+          <a:ln w="15875">
+            <a:tailEnd type="triangle" w="lg" len="lg"/>
+          </a:ln>
+        </p:spPr>
+        <p:style>
+          <a:lnRef idx="2">
+            <a:schemeClr val="dk1"/>
+          </a:lnRef>
+          <a:fillRef idx="0">
+            <a:schemeClr val="dk1"/>
+          </a:fillRef>
+          <a:effectRef idx="1">
+            <a:schemeClr val="dk1"/>
+          </a:effectRef>
+          <a:fontRef idx="minor">
+            <a:schemeClr val="tx1"/>
+          </a:fontRef>
+        </p:style>
+      </p:cxnSp>
+      <p:sp>
+        <p:nvSpPr>
+          <p:cNvPr id="12" name="TextBox 11">
+            <a:extLst>
+              <a:ext uri="{FF2B5EF4-FFF2-40B4-BE49-F238E27FC236}">
+                <a16:creationId xmlns:a16="http://schemas.microsoft.com/office/drawing/2014/main" id="{92B8E69B-3D81-684C-E6BF-18B6451FA5A7}"/>
+              </a:ext>
+            </a:extLst>
+          </p:cNvPr>
+          <p:cNvSpPr txBox="1"/>
+          <p:nvPr/>
+        </p:nvSpPr>
+        <p:spPr>
+          <a:xfrm>
+            <a:off x="836992" y="3414430"/>
+            <a:ext cx="2161042" cy="369332"/>
           </a:xfrm>
           <a:prstGeom prst="rect">
             <a:avLst/>
@@ -3399,1296 +4106,2535 @@
             <a:pPr algn="ctr"/>
             <a:r>
               <a:rPr lang="en-CA" dirty="0"/>
-              <a:t>Species misclassification</a:t>
+              <a:t>Reproductive status</a:t>
             </a:r>
             <a:endParaRPr lang="en-US" dirty="0"/>
           </a:p>
         </p:txBody>
       </p:sp>
-      <p:grpSp>
-        <p:nvGrpSpPr>
-          <p:cNvPr id="161" name="Group 160">
-            <a:extLst>
-              <a:ext uri="{FF2B5EF4-FFF2-40B4-BE49-F238E27FC236}">
-                <a16:creationId xmlns:a16="http://schemas.microsoft.com/office/drawing/2014/main" id="{8D64BC29-6EFC-E3C6-A72C-B6A9B2764F5B}"/>
-              </a:ext>
-            </a:extLst>
-          </p:cNvPr>
-          <p:cNvGrpSpPr/>
-          <p:nvPr/>
-        </p:nvGrpSpPr>
-        <p:grpSpPr>
-          <a:xfrm>
-            <a:off x="1128929" y="1452631"/>
-            <a:ext cx="10087442" cy="4834831"/>
-            <a:chOff x="1128929" y="1452631"/>
-            <a:chExt cx="10087442" cy="4834831"/>
-          </a:xfrm>
-        </p:grpSpPr>
-        <p:sp>
-          <p:nvSpPr>
-            <p:cNvPr id="6" name="TextBox 5">
-              <a:extLst>
-                <a:ext uri="{FF2B5EF4-FFF2-40B4-BE49-F238E27FC236}">
-                  <a16:creationId xmlns:a16="http://schemas.microsoft.com/office/drawing/2014/main" id="{66D2EE54-C9E3-6ACB-EDA5-228E68A9D94A}"/>
-                </a:ext>
-              </a:extLst>
-            </p:cNvPr>
-            <p:cNvSpPr txBox="1"/>
-            <p:nvPr/>
-          </p:nvSpPr>
-          <p:spPr>
-            <a:xfrm>
-              <a:off x="4572722" y="3584158"/>
-              <a:ext cx="1543573" cy="646331"/>
-            </a:xfrm>
-            <a:prstGeom prst="rect">
-              <a:avLst/>
-            </a:prstGeom>
+      <p:sp>
+        <p:nvSpPr>
+          <p:cNvPr id="16" name="TextBox 15">
+            <a:extLst>
+              <a:ext uri="{FF2B5EF4-FFF2-40B4-BE49-F238E27FC236}">
+                <a16:creationId xmlns:a16="http://schemas.microsoft.com/office/drawing/2014/main" id="{B6F529A3-85A8-AEDC-B322-86F50171AD0C}"/>
+              </a:ext>
+            </a:extLst>
+          </p:cNvPr>
+          <p:cNvSpPr txBox="1"/>
+          <p:nvPr/>
+        </p:nvSpPr>
+        <p:spPr>
+          <a:xfrm>
+            <a:off x="1972122" y="2991093"/>
+            <a:ext cx="1013806" cy="369332"/>
+          </a:xfrm>
+          <a:prstGeom prst="rect">
+            <a:avLst/>
+          </a:prstGeom>
+          <a:noFill/>
+          <a:ln>
             <a:solidFill>
-              <a:schemeClr val="accent4">
-                <a:lumMod val="20000"/>
-                <a:lumOff val="80000"/>
+              <a:schemeClr val="bg2">
+                <a:lumMod val="25000"/>
               </a:schemeClr>
             </a:solidFill>
-            <a:ln>
-              <a:solidFill>
-                <a:schemeClr val="bg2">
-                  <a:lumMod val="25000"/>
-                </a:schemeClr>
-              </a:solidFill>
-            </a:ln>
-          </p:spPr>
-          <p:txBody>
-            <a:bodyPr wrap="square" rtlCol="0">
-              <a:spAutoFit/>
-            </a:bodyPr>
-            <a:lstStyle/>
-            <a:p>
-              <a:pPr algn="ctr"/>
-              <a:r>
-                <a:rPr lang="en-CA" dirty="0"/>
-                <a:t>Observed weight</a:t>
-              </a:r>
-              <a:endParaRPr lang="en-US" dirty="0"/>
-            </a:p>
-          </p:txBody>
-        </p:sp>
-        <p:sp>
-          <p:nvSpPr>
-            <p:cNvPr id="7" name="TextBox 6">
-              <a:extLst>
-                <a:ext uri="{FF2B5EF4-FFF2-40B4-BE49-F238E27FC236}">
-                  <a16:creationId xmlns:a16="http://schemas.microsoft.com/office/drawing/2014/main" id="{66D899FF-E46B-4C4C-F564-CDB242385069}"/>
-                </a:ext>
-              </a:extLst>
-            </p:cNvPr>
-            <p:cNvSpPr txBox="1"/>
-            <p:nvPr/>
-          </p:nvSpPr>
-          <p:spPr>
-            <a:xfrm>
-              <a:off x="7297163" y="3726774"/>
-              <a:ext cx="1255594" cy="369332"/>
-            </a:xfrm>
-            <a:prstGeom prst="rect">
-              <a:avLst/>
-            </a:prstGeom>
+          </a:ln>
+        </p:spPr>
+        <p:txBody>
+          <a:bodyPr wrap="square" rtlCol="0">
+            <a:spAutoFit/>
+          </a:bodyPr>
+          <a:lstStyle/>
+          <a:p>
+            <a:pPr algn="ctr"/>
+            <a:r>
+              <a:rPr lang="en-CA" dirty="0"/>
+              <a:t>Sex</a:t>
+            </a:r>
+            <a:endParaRPr lang="en-US" dirty="0"/>
+          </a:p>
+        </p:txBody>
+      </p:sp>
+      <p:sp>
+        <p:nvSpPr>
+          <p:cNvPr id="20" name="TextBox 19">
+            <a:extLst>
+              <a:ext uri="{FF2B5EF4-FFF2-40B4-BE49-F238E27FC236}">
+                <a16:creationId xmlns:a16="http://schemas.microsoft.com/office/drawing/2014/main" id="{77D88D10-E935-8242-A9A8-E8E057C9C66A}"/>
+              </a:ext>
+            </a:extLst>
+          </p:cNvPr>
+          <p:cNvSpPr txBox="1"/>
+          <p:nvPr/>
+        </p:nvSpPr>
+        <p:spPr>
+          <a:xfrm>
+            <a:off x="5155431" y="5058352"/>
+            <a:ext cx="1543573" cy="369332"/>
+          </a:xfrm>
+          <a:prstGeom prst="rect">
+            <a:avLst/>
+          </a:prstGeom>
+          <a:solidFill>
+            <a:schemeClr val="accent1">
+              <a:lumMod val="20000"/>
+              <a:lumOff val="80000"/>
+            </a:schemeClr>
+          </a:solidFill>
+          <a:ln>
             <a:solidFill>
-              <a:schemeClr val="accent1">
-                <a:lumMod val="20000"/>
-                <a:lumOff val="80000"/>
+              <a:schemeClr val="bg2">
+                <a:lumMod val="25000"/>
               </a:schemeClr>
             </a:solidFill>
-            <a:ln>
-              <a:solidFill>
-                <a:schemeClr val="bg2">
-                  <a:lumMod val="25000"/>
-                </a:schemeClr>
-              </a:solidFill>
-            </a:ln>
-          </p:spPr>
-          <p:txBody>
-            <a:bodyPr wrap="square" rtlCol="0">
-              <a:spAutoFit/>
-            </a:bodyPr>
-            <a:lstStyle/>
-            <a:p>
-              <a:pPr algn="ctr"/>
-              <a:r>
-                <a:rPr lang="en-CA" dirty="0"/>
-                <a:t>Weight</a:t>
-              </a:r>
-              <a:endParaRPr lang="en-US" dirty="0"/>
-            </a:p>
-          </p:txBody>
-        </p:sp>
-        <p:sp>
-          <p:nvSpPr>
-            <p:cNvPr id="31" name="TextBox 30">
-              <a:extLst>
-                <a:ext uri="{FF2B5EF4-FFF2-40B4-BE49-F238E27FC236}">
-                  <a16:creationId xmlns:a16="http://schemas.microsoft.com/office/drawing/2014/main" id="{E6B6F01B-8F36-5C5B-7DFF-9286FFACB9B3}"/>
-                </a:ext>
-              </a:extLst>
-            </p:cNvPr>
-            <p:cNvSpPr txBox="1"/>
-            <p:nvPr/>
-          </p:nvSpPr>
-          <p:spPr>
-            <a:xfrm>
-              <a:off x="6451569" y="2203454"/>
-              <a:ext cx="975952" cy="369332"/>
-            </a:xfrm>
-            <a:prstGeom prst="rect">
-              <a:avLst/>
-            </a:prstGeom>
-            <a:noFill/>
-            <a:ln>
-              <a:solidFill>
-                <a:schemeClr val="bg2">
-                  <a:lumMod val="25000"/>
-                </a:schemeClr>
-              </a:solidFill>
-            </a:ln>
-          </p:spPr>
-          <p:txBody>
-            <a:bodyPr wrap="square" rtlCol="0">
-              <a:spAutoFit/>
-            </a:bodyPr>
-            <a:lstStyle/>
-            <a:p>
-              <a:pPr algn="ctr"/>
-              <a:r>
-                <a:rPr lang="en-CA" dirty="0"/>
-                <a:t>Size</a:t>
-              </a:r>
-              <a:endParaRPr lang="en-US" dirty="0"/>
-            </a:p>
-          </p:txBody>
-        </p:sp>
-        <p:cxnSp>
-          <p:nvCxnSpPr>
-            <p:cNvPr id="32" name="Straight Arrow Connector 31">
-              <a:extLst>
-                <a:ext uri="{FF2B5EF4-FFF2-40B4-BE49-F238E27FC236}">
-                  <a16:creationId xmlns:a16="http://schemas.microsoft.com/office/drawing/2014/main" id="{963423FB-626C-B51C-CDDA-F5ADB2F085E3}"/>
-                </a:ext>
-              </a:extLst>
-            </p:cNvPr>
-            <p:cNvCxnSpPr>
-              <a:cxnSpLocks/>
-              <a:stCxn id="31" idx="2"/>
-              <a:endCxn id="7" idx="0"/>
-            </p:cNvCxnSpPr>
-            <p:nvPr/>
-          </p:nvCxnSpPr>
-          <p:spPr>
-            <a:xfrm>
-              <a:off x="6939545" y="2572786"/>
-              <a:ext cx="985415" cy="1153988"/>
-            </a:xfrm>
-            <a:prstGeom prst="straightConnector1">
-              <a:avLst/>
-            </a:prstGeom>
-            <a:ln w="15875">
-              <a:tailEnd type="triangle" w="lg" len="lg"/>
-            </a:ln>
-          </p:spPr>
-          <p:style>
-            <a:lnRef idx="2">
-              <a:schemeClr val="dk1"/>
-            </a:lnRef>
-            <a:fillRef idx="0">
-              <a:schemeClr val="dk1"/>
-            </a:fillRef>
-            <a:effectRef idx="1">
-              <a:schemeClr val="dk1"/>
-            </a:effectRef>
-            <a:fontRef idx="minor">
-              <a:schemeClr val="tx1"/>
-            </a:fontRef>
-          </p:style>
-        </p:cxnSp>
-        <p:cxnSp>
-          <p:nvCxnSpPr>
-            <p:cNvPr id="35" name="Straight Arrow Connector 34">
-              <a:extLst>
-                <a:ext uri="{FF2B5EF4-FFF2-40B4-BE49-F238E27FC236}">
-                  <a16:creationId xmlns:a16="http://schemas.microsoft.com/office/drawing/2014/main" id="{E3A77B78-BE9E-B10F-2478-7F4E8AE0C8A6}"/>
-                </a:ext>
-              </a:extLst>
-            </p:cNvPr>
-            <p:cNvCxnSpPr>
-              <a:cxnSpLocks/>
-              <a:stCxn id="7" idx="1"/>
-              <a:endCxn id="6" idx="3"/>
-            </p:cNvCxnSpPr>
-            <p:nvPr/>
-          </p:nvCxnSpPr>
-          <p:spPr>
-            <a:xfrm flipH="1" flipV="1">
-              <a:off x="6116295" y="3907324"/>
-              <a:ext cx="1180868" cy="4116"/>
-            </a:xfrm>
-            <a:prstGeom prst="straightConnector1">
-              <a:avLst/>
-            </a:prstGeom>
-            <a:ln w="15875">
-              <a:tailEnd type="triangle" w="lg" len="lg"/>
-            </a:ln>
-          </p:spPr>
-          <p:style>
-            <a:lnRef idx="2">
-              <a:schemeClr val="dk1"/>
-            </a:lnRef>
-            <a:fillRef idx="0">
-              <a:schemeClr val="dk1"/>
-            </a:fillRef>
-            <a:effectRef idx="1">
-              <a:schemeClr val="dk1"/>
-            </a:effectRef>
-            <a:fontRef idx="minor">
-              <a:schemeClr val="tx1"/>
-            </a:fontRef>
-          </p:style>
-        </p:cxnSp>
-        <p:sp>
-          <p:nvSpPr>
-            <p:cNvPr id="51" name="TextBox 50">
-              <a:extLst>
-                <a:ext uri="{FF2B5EF4-FFF2-40B4-BE49-F238E27FC236}">
-                  <a16:creationId xmlns:a16="http://schemas.microsoft.com/office/drawing/2014/main" id="{78A80040-1A25-9E7B-7613-FB60C487818D}"/>
-                </a:ext>
-              </a:extLst>
-            </p:cNvPr>
-            <p:cNvSpPr txBox="1"/>
-            <p:nvPr/>
-          </p:nvSpPr>
-          <p:spPr>
-            <a:xfrm>
-              <a:off x="8235951" y="5918130"/>
-              <a:ext cx="1255594" cy="369332"/>
-            </a:xfrm>
-            <a:prstGeom prst="rect">
-              <a:avLst/>
-            </a:prstGeom>
+          </a:ln>
+        </p:spPr>
+        <p:txBody>
+          <a:bodyPr wrap="square" rtlCol="0">
+            <a:spAutoFit/>
+          </a:bodyPr>
+          <a:lstStyle/>
+          <a:p>
+            <a:pPr algn="ctr"/>
+            <a:r>
+              <a:rPr lang="en-CA" dirty="0"/>
+              <a:t>Damage</a:t>
+            </a:r>
+            <a:endParaRPr lang="en-US" dirty="0"/>
+          </a:p>
+        </p:txBody>
+      </p:sp>
+      <p:sp>
+        <p:nvSpPr>
+          <p:cNvPr id="21" name="TextBox 20">
+            <a:extLst>
+              <a:ext uri="{FF2B5EF4-FFF2-40B4-BE49-F238E27FC236}">
+                <a16:creationId xmlns:a16="http://schemas.microsoft.com/office/drawing/2014/main" id="{43FCCED7-537D-3E59-3224-122D4832B6C5}"/>
+              </a:ext>
+            </a:extLst>
+          </p:cNvPr>
+          <p:cNvSpPr txBox="1"/>
+          <p:nvPr/>
+        </p:nvSpPr>
+        <p:spPr>
+          <a:xfrm>
+            <a:off x="5117063" y="4604618"/>
+            <a:ext cx="1543572" cy="369332"/>
+          </a:xfrm>
+          <a:prstGeom prst="rect">
+            <a:avLst/>
+          </a:prstGeom>
+          <a:solidFill>
+            <a:schemeClr val="accent1">
+              <a:lumMod val="20000"/>
+              <a:lumOff val="80000"/>
+            </a:schemeClr>
+          </a:solidFill>
+          <a:ln>
             <a:solidFill>
-              <a:schemeClr val="accent1">
-                <a:lumMod val="20000"/>
-                <a:lumOff val="80000"/>
+              <a:schemeClr val="bg2">
+                <a:lumMod val="25000"/>
               </a:schemeClr>
             </a:solidFill>
-            <a:ln>
-              <a:solidFill>
-                <a:schemeClr val="bg2">
-                  <a:lumMod val="25000"/>
-                </a:schemeClr>
-              </a:solidFill>
-            </a:ln>
-          </p:spPr>
-          <p:txBody>
-            <a:bodyPr wrap="square" rtlCol="0">
-              <a:spAutoFit/>
-            </a:bodyPr>
-            <a:lstStyle/>
-            <a:p>
-              <a:pPr algn="ctr"/>
-              <a:r>
-                <a:rPr lang="en-CA" dirty="0"/>
-                <a:t>Disease</a:t>
-              </a:r>
-              <a:endParaRPr lang="en-US" dirty="0"/>
-            </a:p>
-          </p:txBody>
-        </p:sp>
-        <p:sp>
-          <p:nvSpPr>
-            <p:cNvPr id="52" name="TextBox 51">
-              <a:extLst>
-                <a:ext uri="{FF2B5EF4-FFF2-40B4-BE49-F238E27FC236}">
-                  <a16:creationId xmlns:a16="http://schemas.microsoft.com/office/drawing/2014/main" id="{2A125DB6-35AB-031A-1DDB-BE3284CB6188}"/>
-                </a:ext>
-              </a:extLst>
-            </p:cNvPr>
-            <p:cNvSpPr txBox="1"/>
-            <p:nvPr/>
-          </p:nvSpPr>
-          <p:spPr>
-            <a:xfrm>
-              <a:off x="7297163" y="4657434"/>
-              <a:ext cx="1255594" cy="646331"/>
-            </a:xfrm>
-            <a:prstGeom prst="rect">
-              <a:avLst/>
-            </a:prstGeom>
+          </a:ln>
+        </p:spPr>
+        <p:txBody>
+          <a:bodyPr wrap="square" rtlCol="0">
+            <a:spAutoFit/>
+          </a:bodyPr>
+          <a:lstStyle/>
+          <a:p>
+            <a:pPr algn="ctr"/>
+            <a:r>
+              <a:rPr lang="en-CA" dirty="0"/>
+              <a:t>Regurgitation</a:t>
+            </a:r>
+            <a:endParaRPr lang="en-US" dirty="0"/>
+          </a:p>
+        </p:txBody>
+      </p:sp>
+      <p:cxnSp>
+        <p:nvCxnSpPr>
+          <p:cNvPr id="23" name="Straight Arrow Connector 22">
+            <a:extLst>
+              <a:ext uri="{FF2B5EF4-FFF2-40B4-BE49-F238E27FC236}">
+                <a16:creationId xmlns:a16="http://schemas.microsoft.com/office/drawing/2014/main" id="{11BAC949-310E-78A8-1863-0EB97D58511F}"/>
+              </a:ext>
+            </a:extLst>
+          </p:cNvPr>
+          <p:cNvCxnSpPr>
+            <a:cxnSpLocks/>
+            <a:stCxn id="16" idx="3"/>
+            <a:endCxn id="7" idx="1"/>
+          </p:cNvCxnSpPr>
+          <p:nvPr/>
+        </p:nvCxnSpPr>
+        <p:spPr>
+          <a:xfrm>
+            <a:off x="2985928" y="3175759"/>
+            <a:ext cx="881899" cy="424215"/>
+          </a:xfrm>
+          <a:prstGeom prst="straightConnector1">
+            <a:avLst/>
+          </a:prstGeom>
+          <a:ln w="15875">
+            <a:tailEnd type="triangle" w="lg" len="lg"/>
+          </a:ln>
+        </p:spPr>
+        <p:style>
+          <a:lnRef idx="2">
+            <a:schemeClr val="dk1"/>
+          </a:lnRef>
+          <a:fillRef idx="0">
+            <a:schemeClr val="dk1"/>
+          </a:fillRef>
+          <a:effectRef idx="1">
+            <a:schemeClr val="dk1"/>
+          </a:effectRef>
+          <a:fontRef idx="minor">
+            <a:schemeClr val="tx1"/>
+          </a:fontRef>
+        </p:style>
+      </p:cxnSp>
+      <p:cxnSp>
+        <p:nvCxnSpPr>
+          <p:cNvPr id="37" name="Straight Arrow Connector 36">
+            <a:extLst>
+              <a:ext uri="{FF2B5EF4-FFF2-40B4-BE49-F238E27FC236}">
+                <a16:creationId xmlns:a16="http://schemas.microsoft.com/office/drawing/2014/main" id="{98220011-8F92-88DB-2D08-5AD3C3C0AAC5}"/>
+              </a:ext>
+            </a:extLst>
+          </p:cNvPr>
+          <p:cNvCxnSpPr>
+            <a:cxnSpLocks/>
+            <a:stCxn id="12" idx="3"/>
+            <a:endCxn id="7" idx="1"/>
+          </p:cNvCxnSpPr>
+          <p:nvPr/>
+        </p:nvCxnSpPr>
+        <p:spPr>
+          <a:xfrm>
+            <a:off x="2998034" y="3599096"/>
+            <a:ext cx="869793" cy="878"/>
+          </a:xfrm>
+          <a:prstGeom prst="straightConnector1">
+            <a:avLst/>
+          </a:prstGeom>
+          <a:ln w="15875">
+            <a:tailEnd type="triangle" w="lg" len="lg"/>
+          </a:ln>
+        </p:spPr>
+        <p:style>
+          <a:lnRef idx="2">
+            <a:schemeClr val="dk1"/>
+          </a:lnRef>
+          <a:fillRef idx="0">
+            <a:schemeClr val="dk1"/>
+          </a:fillRef>
+          <a:effectRef idx="1">
+            <a:schemeClr val="dk1"/>
+          </a:effectRef>
+          <a:fontRef idx="minor">
+            <a:schemeClr val="tx1"/>
+          </a:fontRef>
+        </p:style>
+      </p:cxnSp>
+      <p:cxnSp>
+        <p:nvCxnSpPr>
+          <p:cNvPr id="46" name="Straight Arrow Connector 45">
+            <a:extLst>
+              <a:ext uri="{FF2B5EF4-FFF2-40B4-BE49-F238E27FC236}">
+                <a16:creationId xmlns:a16="http://schemas.microsoft.com/office/drawing/2014/main" id="{E44A5FBA-5BE9-B3E5-BBF7-466BC7B73B5C}"/>
+              </a:ext>
+            </a:extLst>
+          </p:cNvPr>
+          <p:cNvCxnSpPr>
+            <a:cxnSpLocks/>
+            <a:stCxn id="20" idx="3"/>
+            <a:endCxn id="6" idx="1"/>
+          </p:cNvCxnSpPr>
+          <p:nvPr/>
+        </p:nvCxnSpPr>
+        <p:spPr>
+          <a:xfrm flipV="1">
+            <a:off x="6699004" y="3574227"/>
+            <a:ext cx="564803" cy="1668791"/>
+          </a:xfrm>
+          <a:prstGeom prst="straightConnector1">
+            <a:avLst/>
+          </a:prstGeom>
+          <a:ln w="15875">
+            <a:tailEnd type="triangle" w="lg" len="lg"/>
+          </a:ln>
+        </p:spPr>
+        <p:style>
+          <a:lnRef idx="2">
+            <a:schemeClr val="dk1"/>
+          </a:lnRef>
+          <a:fillRef idx="0">
+            <a:schemeClr val="dk1"/>
+          </a:fillRef>
+          <a:effectRef idx="1">
+            <a:schemeClr val="dk1"/>
+          </a:effectRef>
+          <a:fontRef idx="minor">
+            <a:schemeClr val="tx1"/>
+          </a:fontRef>
+        </p:style>
+      </p:cxnSp>
+      <p:cxnSp>
+        <p:nvCxnSpPr>
+          <p:cNvPr id="55" name="Straight Arrow Connector 54">
+            <a:extLst>
+              <a:ext uri="{FF2B5EF4-FFF2-40B4-BE49-F238E27FC236}">
+                <a16:creationId xmlns:a16="http://schemas.microsoft.com/office/drawing/2014/main" id="{B27EB1ED-B259-DACE-9B3E-E60C4A109BE4}"/>
+              </a:ext>
+            </a:extLst>
+          </p:cNvPr>
+          <p:cNvCxnSpPr>
+            <a:cxnSpLocks/>
+            <a:stCxn id="21" idx="3"/>
+            <a:endCxn id="6" idx="1"/>
+          </p:cNvCxnSpPr>
+          <p:nvPr/>
+        </p:nvCxnSpPr>
+        <p:spPr>
+          <a:xfrm flipV="1">
+            <a:off x="6660635" y="3574227"/>
+            <a:ext cx="603172" cy="1215057"/>
+          </a:xfrm>
+          <a:prstGeom prst="straightConnector1">
+            <a:avLst/>
+          </a:prstGeom>
+          <a:ln w="15875">
+            <a:tailEnd type="triangle" w="lg" len="lg"/>
+          </a:ln>
+        </p:spPr>
+        <p:style>
+          <a:lnRef idx="2">
+            <a:schemeClr val="dk1"/>
+          </a:lnRef>
+          <a:fillRef idx="0">
+            <a:schemeClr val="dk1"/>
+          </a:fillRef>
+          <a:effectRef idx="1">
+            <a:schemeClr val="dk1"/>
+          </a:effectRef>
+          <a:fontRef idx="minor">
+            <a:schemeClr val="tx1"/>
+          </a:fontRef>
+        </p:style>
+      </p:cxnSp>
+      <p:sp>
+        <p:nvSpPr>
+          <p:cNvPr id="124" name="TextBox 123">
+            <a:extLst>
+              <a:ext uri="{FF2B5EF4-FFF2-40B4-BE49-F238E27FC236}">
+                <a16:creationId xmlns:a16="http://schemas.microsoft.com/office/drawing/2014/main" id="{709450CD-C761-904C-8DB1-A28FB820501F}"/>
+              </a:ext>
+            </a:extLst>
+          </p:cNvPr>
+          <p:cNvSpPr txBox="1"/>
+          <p:nvPr/>
+        </p:nvSpPr>
+        <p:spPr>
+          <a:xfrm>
+            <a:off x="4414898" y="4146986"/>
+            <a:ext cx="2245737" cy="369332"/>
+          </a:xfrm>
+          <a:prstGeom prst="rect">
+            <a:avLst/>
+          </a:prstGeom>
+          <a:solidFill>
+            <a:srgbClr val="DAE3F3"/>
+          </a:solidFill>
+          <a:ln>
             <a:solidFill>
-              <a:schemeClr val="accent1">
-                <a:lumMod val="20000"/>
-                <a:lumOff val="80000"/>
+              <a:schemeClr val="bg2">
+                <a:lumMod val="25000"/>
               </a:schemeClr>
             </a:solidFill>
-            <a:ln>
-              <a:solidFill>
-                <a:schemeClr val="bg2">
-                  <a:lumMod val="25000"/>
-                </a:schemeClr>
-              </a:solidFill>
-            </a:ln>
-          </p:spPr>
-          <p:txBody>
-            <a:bodyPr wrap="square" rtlCol="0">
-              <a:spAutoFit/>
-            </a:bodyPr>
-            <a:lstStyle/>
-            <a:p>
-              <a:pPr algn="ctr"/>
-              <a:r>
-                <a:rPr lang="en-CA" dirty="0"/>
-                <a:t>Health Condition</a:t>
-              </a:r>
-              <a:endParaRPr lang="en-US" dirty="0"/>
-            </a:p>
-          </p:txBody>
-        </p:sp>
-        <p:sp>
-          <p:nvSpPr>
-            <p:cNvPr id="53" name="TextBox 52">
-              <a:extLst>
-                <a:ext uri="{FF2B5EF4-FFF2-40B4-BE49-F238E27FC236}">
-                  <a16:creationId xmlns:a16="http://schemas.microsoft.com/office/drawing/2014/main" id="{8C213A89-C677-95D2-4F22-86C512369243}"/>
-                </a:ext>
-              </a:extLst>
-            </p:cNvPr>
-            <p:cNvSpPr txBox="1"/>
-            <p:nvPr/>
-          </p:nvSpPr>
-          <p:spPr>
-            <a:xfrm>
-              <a:off x="6465693" y="5918130"/>
-              <a:ext cx="1255594" cy="369332"/>
-            </a:xfrm>
-            <a:prstGeom prst="rect">
-              <a:avLst/>
-            </a:prstGeom>
+          </a:ln>
+        </p:spPr>
+        <p:txBody>
+          <a:bodyPr wrap="square" rtlCol="0">
+            <a:spAutoFit/>
+          </a:bodyPr>
+          <a:lstStyle/>
+          <a:p>
+            <a:pPr algn="ctr"/>
+            <a:r>
+              <a:rPr lang="en-CA" dirty="0"/>
+              <a:t>Transcription error</a:t>
+            </a:r>
+            <a:endParaRPr lang="en-US" dirty="0"/>
+          </a:p>
+        </p:txBody>
+      </p:sp>
+      <p:cxnSp>
+        <p:nvCxnSpPr>
+          <p:cNvPr id="127" name="Straight Arrow Connector 126">
+            <a:extLst>
+              <a:ext uri="{FF2B5EF4-FFF2-40B4-BE49-F238E27FC236}">
+                <a16:creationId xmlns:a16="http://schemas.microsoft.com/office/drawing/2014/main" id="{9AFEF128-0F63-3C83-88B9-47512DE4F078}"/>
+              </a:ext>
+            </a:extLst>
+          </p:cNvPr>
+          <p:cNvCxnSpPr>
+            <a:cxnSpLocks/>
+            <a:stCxn id="124" idx="0"/>
+            <a:endCxn id="6" idx="1"/>
+          </p:cNvCxnSpPr>
+          <p:nvPr/>
+        </p:nvCxnSpPr>
+        <p:spPr>
+          <a:xfrm flipV="1">
+            <a:off x="5537767" y="3574227"/>
+            <a:ext cx="1726040" cy="572759"/>
+          </a:xfrm>
+          <a:prstGeom prst="straightConnector1">
+            <a:avLst/>
+          </a:prstGeom>
+          <a:ln w="15875">
+            <a:tailEnd type="triangle" w="lg" len="lg"/>
+          </a:ln>
+        </p:spPr>
+        <p:style>
+          <a:lnRef idx="2">
+            <a:schemeClr val="dk1"/>
+          </a:lnRef>
+          <a:fillRef idx="0">
+            <a:schemeClr val="dk1"/>
+          </a:fillRef>
+          <a:effectRef idx="1">
+            <a:schemeClr val="dk1"/>
+          </a:effectRef>
+          <a:fontRef idx="minor">
+            <a:schemeClr val="tx1"/>
+          </a:fontRef>
+        </p:style>
+      </p:cxnSp>
+      <p:sp>
+        <p:nvSpPr>
+          <p:cNvPr id="132" name="TextBox 131">
+            <a:extLst>
+              <a:ext uri="{FF2B5EF4-FFF2-40B4-BE49-F238E27FC236}">
+                <a16:creationId xmlns:a16="http://schemas.microsoft.com/office/drawing/2014/main" id="{F10B119E-8265-C5A4-A5B4-1EA03B074C9F}"/>
+              </a:ext>
+            </a:extLst>
+          </p:cNvPr>
+          <p:cNvSpPr txBox="1"/>
+          <p:nvPr/>
+        </p:nvSpPr>
+        <p:spPr>
+          <a:xfrm>
+            <a:off x="7361396" y="2451364"/>
+            <a:ext cx="1295570" cy="646331"/>
+          </a:xfrm>
+          <a:prstGeom prst="rect">
+            <a:avLst/>
+          </a:prstGeom>
+          <a:solidFill>
+            <a:schemeClr val="accent4">
+              <a:lumMod val="20000"/>
+              <a:lumOff val="80000"/>
+            </a:schemeClr>
+          </a:solidFill>
+          <a:ln w="19050">
             <a:solidFill>
-              <a:schemeClr val="accent1">
-                <a:lumMod val="20000"/>
-                <a:lumOff val="80000"/>
+              <a:schemeClr val="bg2">
+                <a:lumMod val="25000"/>
               </a:schemeClr>
             </a:solidFill>
-            <a:ln>
-              <a:solidFill>
-                <a:schemeClr val="bg2">
-                  <a:lumMod val="25000"/>
-                </a:schemeClr>
-              </a:solidFill>
-            </a:ln>
-          </p:spPr>
-          <p:txBody>
-            <a:bodyPr wrap="square" rtlCol="0">
-              <a:spAutoFit/>
-            </a:bodyPr>
-            <a:lstStyle/>
-            <a:p>
-              <a:pPr algn="ctr"/>
-              <a:r>
-                <a:rPr lang="en-CA" dirty="0"/>
-                <a:t>Food</a:t>
-              </a:r>
-              <a:endParaRPr lang="en-US" dirty="0"/>
-            </a:p>
-          </p:txBody>
-        </p:sp>
-        <p:cxnSp>
-          <p:nvCxnSpPr>
-            <p:cNvPr id="54" name="Straight Arrow Connector 53">
-              <a:extLst>
-                <a:ext uri="{FF2B5EF4-FFF2-40B4-BE49-F238E27FC236}">
-                  <a16:creationId xmlns:a16="http://schemas.microsoft.com/office/drawing/2014/main" id="{BB2EDBE4-888C-B516-3C53-65625BE2C6F7}"/>
-                </a:ext>
-              </a:extLst>
-            </p:cNvPr>
-            <p:cNvCxnSpPr>
-              <a:cxnSpLocks/>
-              <a:stCxn id="53" idx="0"/>
-              <a:endCxn id="52" idx="2"/>
-            </p:cNvCxnSpPr>
-            <p:nvPr/>
-          </p:nvCxnSpPr>
-          <p:spPr>
-            <a:xfrm flipV="1">
-              <a:off x="7093490" y="5303765"/>
-              <a:ext cx="831470" cy="614365"/>
-            </a:xfrm>
-            <a:prstGeom prst="straightConnector1">
-              <a:avLst/>
-            </a:prstGeom>
-            <a:ln w="15875">
-              <a:tailEnd type="triangle" w="lg" len="lg"/>
-            </a:ln>
-          </p:spPr>
-          <p:style>
-            <a:lnRef idx="2">
-              <a:schemeClr val="dk1"/>
-            </a:lnRef>
-            <a:fillRef idx="0">
-              <a:schemeClr val="dk1"/>
-            </a:fillRef>
-            <a:effectRef idx="1">
-              <a:schemeClr val="dk1"/>
-            </a:effectRef>
-            <a:fontRef idx="minor">
-              <a:schemeClr val="tx1"/>
-            </a:fontRef>
-          </p:style>
-        </p:cxnSp>
-        <p:cxnSp>
-          <p:nvCxnSpPr>
-            <p:cNvPr id="57" name="Straight Arrow Connector 56">
-              <a:extLst>
-                <a:ext uri="{FF2B5EF4-FFF2-40B4-BE49-F238E27FC236}">
-                  <a16:creationId xmlns:a16="http://schemas.microsoft.com/office/drawing/2014/main" id="{C0626B02-C201-B73B-10DF-85F16A3052A9}"/>
-                </a:ext>
-              </a:extLst>
-            </p:cNvPr>
-            <p:cNvCxnSpPr>
-              <a:cxnSpLocks/>
-              <a:stCxn id="51" idx="0"/>
-              <a:endCxn id="52" idx="2"/>
-            </p:cNvCxnSpPr>
-            <p:nvPr/>
-          </p:nvCxnSpPr>
-          <p:spPr>
-            <a:xfrm flipH="1" flipV="1">
-              <a:off x="7924960" y="5303765"/>
-              <a:ext cx="938788" cy="614365"/>
-            </a:xfrm>
-            <a:prstGeom prst="straightConnector1">
-              <a:avLst/>
-            </a:prstGeom>
-            <a:ln w="15875">
-              <a:tailEnd type="triangle" w="lg" len="lg"/>
-            </a:ln>
-          </p:spPr>
-          <p:style>
-            <a:lnRef idx="2">
-              <a:schemeClr val="dk1"/>
-            </a:lnRef>
-            <a:fillRef idx="0">
-              <a:schemeClr val="dk1"/>
-            </a:fillRef>
-            <a:effectRef idx="1">
-              <a:schemeClr val="dk1"/>
-            </a:effectRef>
-            <a:fontRef idx="minor">
-              <a:schemeClr val="tx1"/>
-            </a:fontRef>
-          </p:style>
-        </p:cxnSp>
-        <p:cxnSp>
-          <p:nvCxnSpPr>
-            <p:cNvPr id="73" name="Straight Arrow Connector 72">
-              <a:extLst>
-                <a:ext uri="{FF2B5EF4-FFF2-40B4-BE49-F238E27FC236}">
-                  <a16:creationId xmlns:a16="http://schemas.microsoft.com/office/drawing/2014/main" id="{2CD9F0FA-36A9-084D-EB4D-5E4D7D0AE4A8}"/>
-                </a:ext>
-              </a:extLst>
-            </p:cNvPr>
-            <p:cNvCxnSpPr>
-              <a:cxnSpLocks/>
-              <a:stCxn id="52" idx="0"/>
-              <a:endCxn id="7" idx="2"/>
-            </p:cNvCxnSpPr>
-            <p:nvPr/>
-          </p:nvCxnSpPr>
-          <p:spPr>
-            <a:xfrm flipV="1">
-              <a:off x="7924960" y="4096106"/>
-              <a:ext cx="0" cy="561328"/>
-            </a:xfrm>
-            <a:prstGeom prst="straightConnector1">
-              <a:avLst/>
-            </a:prstGeom>
-            <a:ln w="15875">
-              <a:tailEnd type="triangle" w="lg" len="lg"/>
-            </a:ln>
-          </p:spPr>
-          <p:style>
-            <a:lnRef idx="2">
-              <a:schemeClr val="dk1"/>
-            </a:lnRef>
-            <a:fillRef idx="0">
-              <a:schemeClr val="dk1"/>
-            </a:fillRef>
-            <a:effectRef idx="1">
-              <a:schemeClr val="dk1"/>
-            </a:effectRef>
-            <a:fontRef idx="minor">
-              <a:schemeClr val="tx1"/>
-            </a:fontRef>
-          </p:style>
-        </p:cxnSp>
-        <p:sp>
-          <p:nvSpPr>
-            <p:cNvPr id="165" name="TextBox 164">
-              <a:extLst>
-                <a:ext uri="{FF2B5EF4-FFF2-40B4-BE49-F238E27FC236}">
-                  <a16:creationId xmlns:a16="http://schemas.microsoft.com/office/drawing/2014/main" id="{892BB7A8-3637-53C8-832E-E51042C1473A}"/>
-                </a:ext>
-              </a:extLst>
-            </p:cNvPr>
-            <p:cNvSpPr txBox="1"/>
-            <p:nvPr/>
-          </p:nvSpPr>
-          <p:spPr>
-            <a:xfrm>
-              <a:off x="1128929" y="3590730"/>
-              <a:ext cx="1255594" cy="646331"/>
-            </a:xfrm>
-            <a:prstGeom prst="rect">
-              <a:avLst/>
-            </a:prstGeom>
+          </a:ln>
+        </p:spPr>
+        <p:txBody>
+          <a:bodyPr wrap="square" rtlCol="0">
+            <a:spAutoFit/>
+          </a:bodyPr>
+          <a:lstStyle/>
+          <a:p>
+            <a:pPr algn="ctr"/>
+            <a:r>
+              <a:rPr lang="en-CA" dirty="0"/>
+              <a:t>Observed size</a:t>
+            </a:r>
+            <a:endParaRPr lang="en-US" dirty="0"/>
+          </a:p>
+        </p:txBody>
+      </p:sp>
+      <p:sp>
+        <p:nvSpPr>
+          <p:cNvPr id="174" name="TextBox 173">
+            <a:extLst>
+              <a:ext uri="{FF2B5EF4-FFF2-40B4-BE49-F238E27FC236}">
+                <a16:creationId xmlns:a16="http://schemas.microsoft.com/office/drawing/2014/main" id="{B3C7D58D-A375-A029-5D80-0B389F4CBC13}"/>
+              </a:ext>
+            </a:extLst>
+          </p:cNvPr>
+          <p:cNvSpPr txBox="1"/>
+          <p:nvPr/>
+        </p:nvSpPr>
+        <p:spPr>
+          <a:xfrm>
+            <a:off x="4412131" y="1818600"/>
+            <a:ext cx="2245737" cy="369332"/>
+          </a:xfrm>
+          <a:prstGeom prst="rect">
+            <a:avLst/>
+          </a:prstGeom>
+          <a:solidFill>
+            <a:srgbClr val="DAE3F3"/>
+          </a:solidFill>
+          <a:ln>
             <a:solidFill>
-              <a:schemeClr val="accent1">
-                <a:lumMod val="20000"/>
-                <a:lumOff val="80000"/>
+              <a:schemeClr val="bg2">
+                <a:lumMod val="25000"/>
               </a:schemeClr>
             </a:solidFill>
-            <a:ln>
-              <a:solidFill>
-                <a:schemeClr val="bg2">
-                  <a:lumMod val="25000"/>
-                </a:schemeClr>
-              </a:solidFill>
-            </a:ln>
-          </p:spPr>
-          <p:txBody>
-            <a:bodyPr wrap="square" rtlCol="0">
-              <a:spAutoFit/>
-            </a:bodyPr>
-            <a:lstStyle/>
-            <a:p>
-              <a:pPr algn="ctr"/>
-              <a:r>
-                <a:rPr lang="en-CA" dirty="0"/>
-                <a:t>Sea conditions</a:t>
-              </a:r>
-              <a:endParaRPr lang="en-US" dirty="0"/>
-            </a:p>
-          </p:txBody>
-        </p:sp>
-        <p:sp>
-          <p:nvSpPr>
-            <p:cNvPr id="166" name="TextBox 165">
-              <a:extLst>
-                <a:ext uri="{FF2B5EF4-FFF2-40B4-BE49-F238E27FC236}">
-                  <a16:creationId xmlns:a16="http://schemas.microsoft.com/office/drawing/2014/main" id="{30DCC95E-0F0A-8B27-D036-E883DB276209}"/>
-                </a:ext>
-              </a:extLst>
-            </p:cNvPr>
-            <p:cNvSpPr txBox="1"/>
-            <p:nvPr/>
-          </p:nvSpPr>
-          <p:spPr>
-            <a:xfrm>
-              <a:off x="2850825" y="3722657"/>
-              <a:ext cx="1255594" cy="369332"/>
-            </a:xfrm>
-            <a:prstGeom prst="rect">
-              <a:avLst/>
-            </a:prstGeom>
+          </a:ln>
+        </p:spPr>
+        <p:txBody>
+          <a:bodyPr wrap="square" rtlCol="0">
+            <a:spAutoFit/>
+          </a:bodyPr>
+          <a:lstStyle/>
+          <a:p>
+            <a:pPr algn="ctr"/>
+            <a:r>
+              <a:rPr lang="en-CA" dirty="0"/>
+              <a:t>Transcription error</a:t>
+            </a:r>
+            <a:endParaRPr lang="en-US" dirty="0"/>
+          </a:p>
+        </p:txBody>
+      </p:sp>
+      <p:cxnSp>
+        <p:nvCxnSpPr>
+          <p:cNvPr id="175" name="Straight Arrow Connector 174">
+            <a:extLst>
+              <a:ext uri="{FF2B5EF4-FFF2-40B4-BE49-F238E27FC236}">
+                <a16:creationId xmlns:a16="http://schemas.microsoft.com/office/drawing/2014/main" id="{3A3C9B2E-1C9C-1065-311E-3AD9656E1C01}"/>
+              </a:ext>
+            </a:extLst>
+          </p:cNvPr>
+          <p:cNvCxnSpPr>
+            <a:cxnSpLocks/>
+            <a:stCxn id="174" idx="2"/>
+            <a:endCxn id="132" idx="1"/>
+          </p:cNvCxnSpPr>
+          <p:nvPr/>
+        </p:nvCxnSpPr>
+        <p:spPr>
+          <a:xfrm>
+            <a:off x="5535000" y="2187932"/>
+            <a:ext cx="1826396" cy="586598"/>
+          </a:xfrm>
+          <a:prstGeom prst="straightConnector1">
+            <a:avLst/>
+          </a:prstGeom>
+          <a:ln w="15875">
+            <a:tailEnd type="triangle" w="lg" len="lg"/>
+          </a:ln>
+        </p:spPr>
+        <p:style>
+          <a:lnRef idx="2">
+            <a:schemeClr val="dk1"/>
+          </a:lnRef>
+          <a:fillRef idx="0">
+            <a:schemeClr val="dk1"/>
+          </a:fillRef>
+          <a:effectRef idx="1">
+            <a:schemeClr val="dk1"/>
+          </a:effectRef>
+          <a:fontRef idx="minor">
+            <a:schemeClr val="tx1"/>
+          </a:fontRef>
+        </p:style>
+      </p:cxnSp>
+      <p:sp>
+        <p:nvSpPr>
+          <p:cNvPr id="200" name="TextBox 199">
+            <a:extLst>
+              <a:ext uri="{FF2B5EF4-FFF2-40B4-BE49-F238E27FC236}">
+                <a16:creationId xmlns:a16="http://schemas.microsoft.com/office/drawing/2014/main" id="{38C446AE-3B05-16DA-0052-C1F139BBB2EB}"/>
+              </a:ext>
+            </a:extLst>
+          </p:cNvPr>
+          <p:cNvSpPr txBox="1"/>
+          <p:nvPr/>
+        </p:nvSpPr>
+        <p:spPr>
+          <a:xfrm>
+            <a:off x="7149224" y="1686751"/>
+            <a:ext cx="1719915" cy="369332"/>
+          </a:xfrm>
+          <a:prstGeom prst="rect">
+            <a:avLst/>
+          </a:prstGeom>
+          <a:solidFill>
+            <a:schemeClr val="accent1">
+              <a:lumMod val="20000"/>
+              <a:lumOff val="80000"/>
+            </a:schemeClr>
+          </a:solidFill>
+          <a:ln>
             <a:solidFill>
-              <a:schemeClr val="accent1">
-                <a:lumMod val="20000"/>
-                <a:lumOff val="80000"/>
+              <a:schemeClr val="bg2">
+                <a:lumMod val="25000"/>
               </a:schemeClr>
             </a:solidFill>
-            <a:ln>
-              <a:solidFill>
-                <a:schemeClr val="bg2">
-                  <a:lumMod val="25000"/>
-                </a:schemeClr>
-              </a:solidFill>
-            </a:ln>
-          </p:spPr>
-          <p:txBody>
-            <a:bodyPr wrap="square" rtlCol="0">
-              <a:spAutoFit/>
-            </a:bodyPr>
-            <a:lstStyle/>
-            <a:p>
-              <a:pPr algn="ctr"/>
-              <a:r>
-                <a:rPr lang="en-CA" dirty="0"/>
-                <a:t>Scale</a:t>
-              </a:r>
-              <a:endParaRPr lang="en-US" dirty="0"/>
-            </a:p>
-          </p:txBody>
-        </p:sp>
-        <p:cxnSp>
-          <p:nvCxnSpPr>
-            <p:cNvPr id="167" name="Straight Arrow Connector 166">
-              <a:extLst>
-                <a:ext uri="{FF2B5EF4-FFF2-40B4-BE49-F238E27FC236}">
-                  <a16:creationId xmlns:a16="http://schemas.microsoft.com/office/drawing/2014/main" id="{7065B2D9-6F22-52BC-4082-046E22CA4374}"/>
-                </a:ext>
-              </a:extLst>
-            </p:cNvPr>
-            <p:cNvCxnSpPr>
-              <a:cxnSpLocks/>
-              <a:stCxn id="165" idx="3"/>
-              <a:endCxn id="166" idx="1"/>
-            </p:cNvCxnSpPr>
-            <p:nvPr/>
-          </p:nvCxnSpPr>
-          <p:spPr>
-            <a:xfrm flipV="1">
-              <a:off x="2384523" y="3907323"/>
-              <a:ext cx="466302" cy="6573"/>
-            </a:xfrm>
-            <a:prstGeom prst="straightConnector1">
-              <a:avLst/>
-            </a:prstGeom>
-            <a:ln w="15875">
-              <a:tailEnd type="triangle" w="lg" len="lg"/>
-            </a:ln>
-          </p:spPr>
-          <p:style>
-            <a:lnRef idx="2">
-              <a:schemeClr val="dk1"/>
-            </a:lnRef>
-            <a:fillRef idx="0">
-              <a:schemeClr val="dk1"/>
-            </a:fillRef>
-            <a:effectRef idx="1">
-              <a:schemeClr val="dk1"/>
-            </a:effectRef>
-            <a:fontRef idx="minor">
-              <a:schemeClr val="tx1"/>
-            </a:fontRef>
-          </p:style>
-        </p:cxnSp>
-        <p:cxnSp>
-          <p:nvCxnSpPr>
-            <p:cNvPr id="170" name="Straight Arrow Connector 169">
-              <a:extLst>
-                <a:ext uri="{FF2B5EF4-FFF2-40B4-BE49-F238E27FC236}">
-                  <a16:creationId xmlns:a16="http://schemas.microsoft.com/office/drawing/2014/main" id="{6DD3B0E9-A070-5740-2D57-2CDE78F1FCAC}"/>
-                </a:ext>
-              </a:extLst>
-            </p:cNvPr>
-            <p:cNvCxnSpPr>
-              <a:cxnSpLocks/>
-              <a:stCxn id="166" idx="3"/>
-              <a:endCxn id="6" idx="1"/>
-            </p:cNvCxnSpPr>
-            <p:nvPr/>
-          </p:nvCxnSpPr>
-          <p:spPr>
-            <a:xfrm>
-              <a:off x="4106419" y="3907323"/>
-              <a:ext cx="466303" cy="1"/>
-            </a:xfrm>
-            <a:prstGeom prst="straightConnector1">
-              <a:avLst/>
-            </a:prstGeom>
-            <a:ln w="15875">
-              <a:tailEnd type="triangle" w="lg" len="lg"/>
-            </a:ln>
-          </p:spPr>
-          <p:style>
-            <a:lnRef idx="2">
-              <a:schemeClr val="dk1"/>
-            </a:lnRef>
-            <a:fillRef idx="0">
-              <a:schemeClr val="dk1"/>
-            </a:fillRef>
-            <a:effectRef idx="1">
-              <a:schemeClr val="dk1"/>
-            </a:effectRef>
-            <a:fontRef idx="minor">
-              <a:schemeClr val="tx1"/>
-            </a:fontRef>
-          </p:style>
-        </p:cxnSp>
-        <p:sp>
-          <p:nvSpPr>
-            <p:cNvPr id="12" name="TextBox 11">
-              <a:extLst>
-                <a:ext uri="{FF2B5EF4-FFF2-40B4-BE49-F238E27FC236}">
-                  <a16:creationId xmlns:a16="http://schemas.microsoft.com/office/drawing/2014/main" id="{92B8E69B-3D81-684C-E6BF-18B6451FA5A7}"/>
-                </a:ext>
-              </a:extLst>
-            </p:cNvPr>
-            <p:cNvSpPr txBox="1"/>
-            <p:nvPr/>
-          </p:nvSpPr>
-          <p:spPr>
-            <a:xfrm>
-              <a:off x="8314744" y="1452631"/>
-              <a:ext cx="1459340" cy="646331"/>
-            </a:xfrm>
-            <a:prstGeom prst="rect">
-              <a:avLst/>
-            </a:prstGeom>
-            <a:noFill/>
-            <a:ln>
-              <a:solidFill>
-                <a:schemeClr val="bg2">
-                  <a:lumMod val="25000"/>
-                </a:schemeClr>
-              </a:solidFill>
-            </a:ln>
-          </p:spPr>
-          <p:txBody>
-            <a:bodyPr wrap="square" rtlCol="0">
-              <a:spAutoFit/>
-            </a:bodyPr>
-            <a:lstStyle/>
-            <a:p>
-              <a:pPr algn="ctr"/>
-              <a:r>
-                <a:rPr lang="en-CA" dirty="0"/>
-                <a:t>Reproductive stage</a:t>
-              </a:r>
-              <a:endParaRPr lang="en-US" dirty="0"/>
-            </a:p>
-          </p:txBody>
-        </p:sp>
-        <p:sp>
-          <p:nvSpPr>
-            <p:cNvPr id="14" name="TextBox 13">
-              <a:extLst>
-                <a:ext uri="{FF2B5EF4-FFF2-40B4-BE49-F238E27FC236}">
-                  <a16:creationId xmlns:a16="http://schemas.microsoft.com/office/drawing/2014/main" id="{B947194D-7819-0A09-8E64-F5BD64599370}"/>
-                </a:ext>
-              </a:extLst>
-            </p:cNvPr>
-            <p:cNvSpPr txBox="1"/>
-            <p:nvPr/>
-          </p:nvSpPr>
-          <p:spPr>
-            <a:xfrm>
-              <a:off x="9152443" y="2326216"/>
-              <a:ext cx="2063928" cy="369332"/>
-            </a:xfrm>
-            <a:prstGeom prst="rect">
-              <a:avLst/>
-            </a:prstGeom>
-            <a:noFill/>
-            <a:ln>
-              <a:solidFill>
-                <a:schemeClr val="bg2">
-                  <a:lumMod val="25000"/>
-                </a:schemeClr>
-              </a:solidFill>
-            </a:ln>
-          </p:spPr>
-          <p:txBody>
-            <a:bodyPr wrap="square" rtlCol="0">
-              <a:spAutoFit/>
-            </a:bodyPr>
-            <a:lstStyle/>
-            <a:p>
-              <a:pPr algn="ctr"/>
-              <a:r>
-                <a:rPr lang="en-CA" dirty="0"/>
-                <a:t>Maturity stage</a:t>
-              </a:r>
-              <a:endParaRPr lang="en-US" dirty="0"/>
-            </a:p>
-          </p:txBody>
-        </p:sp>
-        <p:sp>
-          <p:nvSpPr>
-            <p:cNvPr id="16" name="TextBox 15">
-              <a:extLst>
-                <a:ext uri="{FF2B5EF4-FFF2-40B4-BE49-F238E27FC236}">
-                  <a16:creationId xmlns:a16="http://schemas.microsoft.com/office/drawing/2014/main" id="{B6F529A3-85A8-AEDC-B322-86F50171AD0C}"/>
-                </a:ext>
-              </a:extLst>
-            </p:cNvPr>
-            <p:cNvSpPr txBox="1"/>
-            <p:nvPr/>
-          </p:nvSpPr>
-          <p:spPr>
-            <a:xfrm>
-              <a:off x="7060780" y="1606447"/>
-              <a:ext cx="1013806" cy="369332"/>
-            </a:xfrm>
-            <a:prstGeom prst="rect">
-              <a:avLst/>
-            </a:prstGeom>
-            <a:noFill/>
-            <a:ln>
-              <a:solidFill>
-                <a:schemeClr val="bg2">
-                  <a:lumMod val="25000"/>
-                </a:schemeClr>
-              </a:solidFill>
-            </a:ln>
-          </p:spPr>
-          <p:txBody>
-            <a:bodyPr wrap="square" rtlCol="0">
-              <a:spAutoFit/>
-            </a:bodyPr>
-            <a:lstStyle/>
-            <a:p>
-              <a:pPr algn="ctr"/>
-              <a:r>
-                <a:rPr lang="en-CA" dirty="0"/>
-                <a:t>Sex</a:t>
-              </a:r>
-              <a:endParaRPr lang="en-US" dirty="0"/>
-            </a:p>
-          </p:txBody>
-        </p:sp>
-        <p:sp>
-          <p:nvSpPr>
-            <p:cNvPr id="18" name="TextBox 17">
-              <a:extLst>
-                <a:ext uri="{FF2B5EF4-FFF2-40B4-BE49-F238E27FC236}">
-                  <a16:creationId xmlns:a16="http://schemas.microsoft.com/office/drawing/2014/main" id="{4C75C04D-A6F5-5C24-E9F8-6D27C9AE6DB5}"/>
-                </a:ext>
-              </a:extLst>
-            </p:cNvPr>
-            <p:cNvSpPr txBox="1"/>
-            <p:nvPr/>
-          </p:nvSpPr>
-          <p:spPr>
-            <a:xfrm>
-              <a:off x="9044414" y="4785926"/>
-              <a:ext cx="1465352" cy="369332"/>
-            </a:xfrm>
-            <a:prstGeom prst="rect">
-              <a:avLst/>
-            </a:prstGeom>
-            <a:noFill/>
-            <a:ln>
-              <a:solidFill>
-                <a:schemeClr val="bg2">
-                  <a:lumMod val="25000"/>
-                </a:schemeClr>
-              </a:solidFill>
-            </a:ln>
-          </p:spPr>
-          <p:txBody>
-            <a:bodyPr wrap="square" rtlCol="0">
-              <a:spAutoFit/>
-            </a:bodyPr>
-            <a:lstStyle/>
-            <a:p>
-              <a:pPr algn="ctr"/>
-              <a:r>
-                <a:rPr lang="en-CA" dirty="0"/>
-                <a:t>Deformations</a:t>
-              </a:r>
-              <a:endParaRPr lang="en-US" dirty="0"/>
-            </a:p>
-          </p:txBody>
-        </p:sp>
-        <p:sp>
-          <p:nvSpPr>
-            <p:cNvPr id="20" name="TextBox 19">
-              <a:extLst>
-                <a:ext uri="{FF2B5EF4-FFF2-40B4-BE49-F238E27FC236}">
-                  <a16:creationId xmlns:a16="http://schemas.microsoft.com/office/drawing/2014/main" id="{77D88D10-E935-8242-A9A8-E8E057C9C66A}"/>
-                </a:ext>
-              </a:extLst>
-            </p:cNvPr>
-            <p:cNvSpPr txBox="1"/>
-            <p:nvPr/>
-          </p:nvSpPr>
-          <p:spPr>
-            <a:xfrm>
-              <a:off x="4571644" y="2653498"/>
-              <a:ext cx="1543573" cy="369332"/>
-            </a:xfrm>
-            <a:prstGeom prst="rect">
-              <a:avLst/>
-            </a:prstGeom>
+          </a:ln>
+        </p:spPr>
+        <p:txBody>
+          <a:bodyPr wrap="square" rtlCol="0">
+            <a:spAutoFit/>
+          </a:bodyPr>
+          <a:lstStyle/>
+          <a:p>
+            <a:pPr algn="ctr"/>
+            <a:r>
+              <a:rPr lang="en-CA" dirty="0"/>
+              <a:t>Size precision</a:t>
+            </a:r>
+            <a:endParaRPr lang="en-US" dirty="0"/>
+          </a:p>
+        </p:txBody>
+      </p:sp>
+      <p:cxnSp>
+        <p:nvCxnSpPr>
+          <p:cNvPr id="222" name="Straight Arrow Connector 221">
+            <a:extLst>
+              <a:ext uri="{FF2B5EF4-FFF2-40B4-BE49-F238E27FC236}">
+                <a16:creationId xmlns:a16="http://schemas.microsoft.com/office/drawing/2014/main" id="{77691B5E-9FBC-7158-6B4C-B64E1B302BD5}"/>
+              </a:ext>
+            </a:extLst>
+          </p:cNvPr>
+          <p:cNvCxnSpPr>
+            <a:cxnSpLocks/>
+            <a:stCxn id="200" idx="2"/>
+            <a:endCxn id="132" idx="0"/>
+          </p:cNvCxnSpPr>
+          <p:nvPr/>
+        </p:nvCxnSpPr>
+        <p:spPr>
+          <a:xfrm flipH="1">
+            <a:off x="8009181" y="2056083"/>
+            <a:ext cx="1" cy="395281"/>
+          </a:xfrm>
+          <a:prstGeom prst="straightConnector1">
+            <a:avLst/>
+          </a:prstGeom>
+          <a:ln w="15875">
+            <a:tailEnd type="triangle" w="lg" len="lg"/>
+          </a:ln>
+        </p:spPr>
+        <p:style>
+          <a:lnRef idx="2">
+            <a:schemeClr val="dk1"/>
+          </a:lnRef>
+          <a:fillRef idx="0">
+            <a:schemeClr val="dk1"/>
+          </a:fillRef>
+          <a:effectRef idx="1">
+            <a:schemeClr val="dk1"/>
+          </a:effectRef>
+          <a:fontRef idx="minor">
+            <a:schemeClr val="tx1"/>
+          </a:fontRef>
+        </p:style>
+      </p:cxnSp>
+      <p:sp>
+        <p:nvSpPr>
+          <p:cNvPr id="308" name="Oval 307">
+            <a:extLst>
+              <a:ext uri="{FF2B5EF4-FFF2-40B4-BE49-F238E27FC236}">
+                <a16:creationId xmlns:a16="http://schemas.microsoft.com/office/drawing/2014/main" id="{6DD90F5C-6C94-B2BB-608C-CA25A4047C35}"/>
+              </a:ext>
+            </a:extLst>
+          </p:cNvPr>
+          <p:cNvSpPr/>
+          <p:nvPr/>
+        </p:nvSpPr>
+        <p:spPr>
+          <a:xfrm>
+            <a:off x="9206072" y="2802833"/>
+            <a:ext cx="2404950" cy="792103"/>
+          </a:xfrm>
+          <a:prstGeom prst="ellipse">
+            <a:avLst/>
+          </a:prstGeom>
+        </p:spPr>
+        <p:style>
+          <a:lnRef idx="2">
+            <a:schemeClr val="accent1">
+              <a:shade val="15000"/>
+            </a:schemeClr>
+          </a:lnRef>
+          <a:fillRef idx="1">
+            <a:schemeClr val="accent1"/>
+          </a:fillRef>
+          <a:effectRef idx="0">
+            <a:schemeClr val="accent1"/>
+          </a:effectRef>
+          <a:fontRef idx="minor">
+            <a:schemeClr val="lt1"/>
+          </a:fontRef>
+        </p:style>
+        <p:txBody>
+          <a:bodyPr rtlCol="0" anchor="ctr"/>
+          <a:lstStyle/>
+          <a:p>
+            <a:pPr algn="ctr"/>
+            <a:r>
+              <a:rPr lang="en-US" dirty="0"/>
+              <a:t>Weight-at-size relationship</a:t>
+            </a:r>
+          </a:p>
+        </p:txBody>
+      </p:sp>
+      <p:sp>
+        <p:nvSpPr>
+          <p:cNvPr id="304" name="TextBox 303">
+            <a:extLst>
+              <a:ext uri="{FF2B5EF4-FFF2-40B4-BE49-F238E27FC236}">
+                <a16:creationId xmlns:a16="http://schemas.microsoft.com/office/drawing/2014/main" id="{F30328CA-36AD-C489-A413-1826CD53652F}"/>
+              </a:ext>
+            </a:extLst>
+          </p:cNvPr>
+          <p:cNvSpPr txBox="1"/>
+          <p:nvPr/>
+        </p:nvSpPr>
+        <p:spPr>
+          <a:xfrm>
+            <a:off x="9636760" y="1541601"/>
+            <a:ext cx="1543573" cy="646331"/>
+          </a:xfrm>
+          <a:prstGeom prst="rect">
+            <a:avLst/>
+          </a:prstGeom>
+          <a:solidFill>
+            <a:schemeClr val="accent2">
+              <a:lumMod val="40000"/>
+              <a:lumOff val="60000"/>
+            </a:schemeClr>
+          </a:solidFill>
+          <a:ln w="19050">
             <a:solidFill>
-              <a:schemeClr val="accent1">
-                <a:lumMod val="20000"/>
-                <a:lumOff val="80000"/>
+              <a:schemeClr val="bg2">
+                <a:lumMod val="25000"/>
               </a:schemeClr>
             </a:solidFill>
-            <a:ln>
-              <a:solidFill>
-                <a:schemeClr val="bg2">
-                  <a:lumMod val="25000"/>
-                </a:schemeClr>
-              </a:solidFill>
-            </a:ln>
-          </p:spPr>
-          <p:txBody>
-            <a:bodyPr wrap="square" rtlCol="0">
-              <a:spAutoFit/>
-            </a:bodyPr>
-            <a:lstStyle/>
-            <a:p>
-              <a:pPr algn="ctr"/>
-              <a:r>
-                <a:rPr lang="en-CA" dirty="0"/>
-                <a:t>Damage</a:t>
-              </a:r>
-              <a:endParaRPr lang="en-US" dirty="0"/>
-            </a:p>
-          </p:txBody>
-        </p:sp>
-        <p:sp>
-          <p:nvSpPr>
-            <p:cNvPr id="21" name="TextBox 20">
-              <a:extLst>
-                <a:ext uri="{FF2B5EF4-FFF2-40B4-BE49-F238E27FC236}">
-                  <a16:creationId xmlns:a16="http://schemas.microsoft.com/office/drawing/2014/main" id="{43FCCED7-537D-3E59-3224-122D4832B6C5}"/>
-                </a:ext>
-              </a:extLst>
-            </p:cNvPr>
-            <p:cNvSpPr txBox="1"/>
-            <p:nvPr/>
-          </p:nvSpPr>
-          <p:spPr>
-            <a:xfrm>
-              <a:off x="4569621" y="4785926"/>
-              <a:ext cx="1543572" cy="369332"/>
-            </a:xfrm>
-            <a:prstGeom prst="rect">
-              <a:avLst/>
-            </a:prstGeom>
+          </a:ln>
+        </p:spPr>
+        <p:txBody>
+          <a:bodyPr wrap="square" rtlCol="0">
+            <a:spAutoFit/>
+          </a:bodyPr>
+          <a:lstStyle/>
+          <a:p>
+            <a:pPr algn="ctr"/>
+            <a:r>
+              <a:rPr lang="en-CA" dirty="0"/>
+              <a:t>Predicted weight</a:t>
+            </a:r>
+            <a:endParaRPr lang="en-US" dirty="0"/>
+          </a:p>
+        </p:txBody>
+      </p:sp>
+      <p:cxnSp>
+        <p:nvCxnSpPr>
+          <p:cNvPr id="305" name="Straight Arrow Connector 304">
+            <a:extLst>
+              <a:ext uri="{FF2B5EF4-FFF2-40B4-BE49-F238E27FC236}">
+                <a16:creationId xmlns:a16="http://schemas.microsoft.com/office/drawing/2014/main" id="{367F9F79-66D7-996D-BF5D-584E3F47CEB1}"/>
+              </a:ext>
+            </a:extLst>
+          </p:cNvPr>
+          <p:cNvCxnSpPr>
+            <a:cxnSpLocks/>
+            <a:stCxn id="308" idx="0"/>
+            <a:endCxn id="304" idx="2"/>
+          </p:cNvCxnSpPr>
+          <p:nvPr/>
+        </p:nvCxnSpPr>
+        <p:spPr>
+          <a:xfrm flipV="1">
+            <a:off x="10408547" y="2187932"/>
+            <a:ext cx="0" cy="614901"/>
+          </a:xfrm>
+          <a:prstGeom prst="straightConnector1">
+            <a:avLst/>
+          </a:prstGeom>
+          <a:ln w="15875">
+            <a:tailEnd type="triangle" w="lg" len="lg"/>
+          </a:ln>
+        </p:spPr>
+        <p:style>
+          <a:lnRef idx="2">
+            <a:schemeClr val="dk1"/>
+          </a:lnRef>
+          <a:fillRef idx="0">
+            <a:schemeClr val="dk1"/>
+          </a:fillRef>
+          <a:effectRef idx="1">
+            <a:schemeClr val="dk1"/>
+          </a:effectRef>
+          <a:fontRef idx="minor">
+            <a:schemeClr val="tx1"/>
+          </a:fontRef>
+        </p:style>
+      </p:cxnSp>
+      <p:cxnSp>
+        <p:nvCxnSpPr>
+          <p:cNvPr id="111" name="Straight Arrow Connector 110">
+            <a:extLst>
+              <a:ext uri="{FF2B5EF4-FFF2-40B4-BE49-F238E27FC236}">
+                <a16:creationId xmlns:a16="http://schemas.microsoft.com/office/drawing/2014/main" id="{79F9588D-3C47-088B-F265-5ACD08F55B61}"/>
+              </a:ext>
+            </a:extLst>
+          </p:cNvPr>
+          <p:cNvCxnSpPr>
+            <a:cxnSpLocks/>
+            <a:stCxn id="31" idx="3"/>
+            <a:endCxn id="132" idx="1"/>
+          </p:cNvCxnSpPr>
+          <p:nvPr/>
+        </p:nvCxnSpPr>
+        <p:spPr>
+          <a:xfrm>
+            <a:off x="5002573" y="2762205"/>
+            <a:ext cx="2358823" cy="12325"/>
+          </a:xfrm>
+          <a:prstGeom prst="straightConnector1">
+            <a:avLst/>
+          </a:prstGeom>
+          <a:ln w="15875">
+            <a:tailEnd type="triangle" w="lg" len="lg"/>
+          </a:ln>
+        </p:spPr>
+        <p:style>
+          <a:lnRef idx="2">
+            <a:schemeClr val="dk1"/>
+          </a:lnRef>
+          <a:fillRef idx="0">
+            <a:schemeClr val="dk1"/>
+          </a:fillRef>
+          <a:effectRef idx="1">
+            <a:schemeClr val="dk1"/>
+          </a:effectRef>
+          <a:fontRef idx="minor">
+            <a:schemeClr val="tx1"/>
+          </a:fontRef>
+        </p:style>
+      </p:cxnSp>
+      <p:cxnSp>
+        <p:nvCxnSpPr>
+          <p:cNvPr id="172" name="Straight Arrow Connector 171">
+            <a:extLst>
+              <a:ext uri="{FF2B5EF4-FFF2-40B4-BE49-F238E27FC236}">
+                <a16:creationId xmlns:a16="http://schemas.microsoft.com/office/drawing/2014/main" id="{0667F11D-3287-29A0-652C-279869458D5A}"/>
+              </a:ext>
+            </a:extLst>
+          </p:cNvPr>
+          <p:cNvCxnSpPr>
+            <a:cxnSpLocks/>
+            <a:stCxn id="132" idx="3"/>
+            <a:endCxn id="308" idx="2"/>
+          </p:cNvCxnSpPr>
+          <p:nvPr/>
+        </p:nvCxnSpPr>
+        <p:spPr>
+          <a:xfrm>
+            <a:off x="8656966" y="2774530"/>
+            <a:ext cx="549106" cy="424355"/>
+          </a:xfrm>
+          <a:prstGeom prst="straightConnector1">
+            <a:avLst/>
+          </a:prstGeom>
+          <a:ln w="15875">
+            <a:tailEnd type="triangle" w="lg" len="lg"/>
+          </a:ln>
+        </p:spPr>
+        <p:style>
+          <a:lnRef idx="2">
+            <a:schemeClr val="dk1"/>
+          </a:lnRef>
+          <a:fillRef idx="0">
+            <a:schemeClr val="dk1"/>
+          </a:fillRef>
+          <a:effectRef idx="1">
+            <a:schemeClr val="dk1"/>
+          </a:effectRef>
+          <a:fontRef idx="minor">
+            <a:schemeClr val="tx1"/>
+          </a:fontRef>
+        </p:style>
+      </p:cxnSp>
+      <p:cxnSp>
+        <p:nvCxnSpPr>
+          <p:cNvPr id="188" name="Straight Arrow Connector 187">
+            <a:extLst>
+              <a:ext uri="{FF2B5EF4-FFF2-40B4-BE49-F238E27FC236}">
+                <a16:creationId xmlns:a16="http://schemas.microsoft.com/office/drawing/2014/main" id="{1EE88644-796D-6F41-8B1E-D850F942FAB0}"/>
+              </a:ext>
+            </a:extLst>
+          </p:cNvPr>
+          <p:cNvCxnSpPr>
+            <a:cxnSpLocks/>
+            <a:stCxn id="7" idx="3"/>
+            <a:endCxn id="6" idx="1"/>
+          </p:cNvCxnSpPr>
+          <p:nvPr/>
+        </p:nvCxnSpPr>
+        <p:spPr>
+          <a:xfrm flipV="1">
+            <a:off x="5123421" y="3574227"/>
+            <a:ext cx="2140386" cy="25747"/>
+          </a:xfrm>
+          <a:prstGeom prst="straightConnector1">
+            <a:avLst/>
+          </a:prstGeom>
+          <a:ln w="15875">
+            <a:tailEnd type="triangle" w="lg" len="lg"/>
+          </a:ln>
+        </p:spPr>
+        <p:style>
+          <a:lnRef idx="2">
+            <a:schemeClr val="dk1"/>
+          </a:lnRef>
+          <a:fillRef idx="0">
+            <a:schemeClr val="dk1"/>
+          </a:fillRef>
+          <a:effectRef idx="1">
+            <a:schemeClr val="dk1"/>
+          </a:effectRef>
+          <a:fontRef idx="minor">
+            <a:schemeClr val="tx1"/>
+          </a:fontRef>
+        </p:style>
+      </p:cxnSp>
+      <p:cxnSp>
+        <p:nvCxnSpPr>
+          <p:cNvPr id="209" name="Straight Arrow Connector 208">
+            <a:extLst>
+              <a:ext uri="{FF2B5EF4-FFF2-40B4-BE49-F238E27FC236}">
+                <a16:creationId xmlns:a16="http://schemas.microsoft.com/office/drawing/2014/main" id="{1655EFE2-EA03-D313-5BE5-776B1356D336}"/>
+              </a:ext>
+            </a:extLst>
+          </p:cNvPr>
+          <p:cNvCxnSpPr>
+            <a:cxnSpLocks/>
+            <a:stCxn id="6" idx="3"/>
+            <a:endCxn id="308" idx="2"/>
+          </p:cNvCxnSpPr>
+          <p:nvPr/>
+        </p:nvCxnSpPr>
+        <p:spPr>
+          <a:xfrm flipV="1">
+            <a:off x="8807380" y="3198885"/>
+            <a:ext cx="398692" cy="375342"/>
+          </a:xfrm>
+          <a:prstGeom prst="straightConnector1">
+            <a:avLst/>
+          </a:prstGeom>
+          <a:ln w="15875">
+            <a:tailEnd type="triangle" w="lg" len="lg"/>
+          </a:ln>
+        </p:spPr>
+        <p:style>
+          <a:lnRef idx="2">
+            <a:schemeClr val="dk1"/>
+          </a:lnRef>
+          <a:fillRef idx="0">
+            <a:schemeClr val="dk1"/>
+          </a:fillRef>
+          <a:effectRef idx="1">
+            <a:schemeClr val="dk1"/>
+          </a:effectRef>
+          <a:fontRef idx="minor">
+            <a:schemeClr val="tx1"/>
+          </a:fontRef>
+        </p:style>
+      </p:cxnSp>
+    </p:spTree>
+    <p:extLst>
+      <p:ext uri="{BB962C8B-B14F-4D97-AF65-F5344CB8AC3E}">
+        <p14:creationId xmlns:p14="http://schemas.microsoft.com/office/powerpoint/2010/main" val="3627303983"/>
+      </p:ext>
+    </p:extLst>
+  </p:cSld>
+  <p:clrMapOvr>
+    <a:masterClrMapping/>
+  </p:clrMapOvr>
+</p:sld>
+</file>
+
+<file path=ppt/slides/slide2.xml><?xml version="1.0" encoding="utf-8"?>
+<p:sld xmlns:a="http://schemas.openxmlformats.org/drawingml/2006/main" xmlns:r="http://schemas.openxmlformats.org/officeDocument/2006/relationships" xmlns:p="http://schemas.openxmlformats.org/presentationml/2006/main">
+  <p:cSld>
+    <p:spTree>
+      <p:nvGrpSpPr>
+        <p:cNvPr id="1" name=""/>
+        <p:cNvGrpSpPr/>
+        <p:nvPr/>
+      </p:nvGrpSpPr>
+      <p:grpSpPr>
+        <a:xfrm>
+          <a:off x="0" y="0"/>
+          <a:ext cx="0" cy="0"/>
+          <a:chOff x="0" y="0"/>
+          <a:chExt cx="0" cy="0"/>
+        </a:xfrm>
+      </p:grpSpPr>
+      <p:sp>
+        <p:nvSpPr>
+          <p:cNvPr id="297" name="Rectangle 296">
+            <a:extLst>
+              <a:ext uri="{FF2B5EF4-FFF2-40B4-BE49-F238E27FC236}">
+                <a16:creationId xmlns:a16="http://schemas.microsoft.com/office/drawing/2014/main" id="{39579F7F-0EB3-D0F7-C381-7239A0079B6F}"/>
+              </a:ext>
+            </a:extLst>
+          </p:cNvPr>
+          <p:cNvSpPr/>
+          <p:nvPr/>
+        </p:nvSpPr>
+        <p:spPr>
+          <a:xfrm>
+            <a:off x="3506515" y="1880642"/>
+            <a:ext cx="1869527" cy="1792498"/>
+          </a:xfrm>
+          <a:prstGeom prst="rect">
+            <a:avLst/>
+          </a:prstGeom>
+          <a:solidFill>
+            <a:srgbClr val="FFF2CC">
+              <a:alpha val="33000"/>
+            </a:srgbClr>
+          </a:solidFill>
+        </p:spPr>
+        <p:style>
+          <a:lnRef idx="2">
+            <a:schemeClr val="accent1">
+              <a:shade val="15000"/>
+            </a:schemeClr>
+          </a:lnRef>
+          <a:fillRef idx="1">
+            <a:schemeClr val="accent1"/>
+          </a:fillRef>
+          <a:effectRef idx="0">
+            <a:schemeClr val="accent1"/>
+          </a:effectRef>
+          <a:fontRef idx="minor">
+            <a:schemeClr val="lt1"/>
+          </a:fontRef>
+        </p:style>
+        <p:txBody>
+          <a:bodyPr rtlCol="0" anchor="ctr"/>
+          <a:lstStyle/>
+          <a:p>
+            <a:pPr algn="ctr"/>
+            <a:endParaRPr lang="en-US"/>
+          </a:p>
+        </p:txBody>
+      </p:sp>
+      <p:sp>
+        <p:nvSpPr>
+          <p:cNvPr id="136" name="TextBox 135">
+            <a:extLst>
+              <a:ext uri="{FF2B5EF4-FFF2-40B4-BE49-F238E27FC236}">
+                <a16:creationId xmlns:a16="http://schemas.microsoft.com/office/drawing/2014/main" id="{42258382-E16D-7301-AF13-B5EB0CF6E3F3}"/>
+              </a:ext>
+            </a:extLst>
+          </p:cNvPr>
+          <p:cNvSpPr txBox="1"/>
+          <p:nvPr/>
+        </p:nvSpPr>
+        <p:spPr>
+          <a:xfrm>
+            <a:off x="260266" y="208741"/>
+            <a:ext cx="6909777" cy="523220"/>
+          </a:xfrm>
+          <a:prstGeom prst="rect">
+            <a:avLst/>
+          </a:prstGeom>
+          <a:noFill/>
+        </p:spPr>
+        <p:txBody>
+          <a:bodyPr wrap="none" rtlCol="0">
+            <a:spAutoFit/>
+          </a:bodyPr>
+          <a:lstStyle/>
+          <a:p>
+            <a:r>
+              <a:rPr lang="en-US" sz="2800" b="1" dirty="0"/>
+              <a:t>Animal weight measurement causal diagram:</a:t>
+            </a:r>
+          </a:p>
+        </p:txBody>
+      </p:sp>
+      <p:sp>
+        <p:nvSpPr>
+          <p:cNvPr id="6" name="TextBox 5">
+            <a:extLst>
+              <a:ext uri="{FF2B5EF4-FFF2-40B4-BE49-F238E27FC236}">
+                <a16:creationId xmlns:a16="http://schemas.microsoft.com/office/drawing/2014/main" id="{66D2EE54-C9E3-6ACB-EDA5-228E68A9D94A}"/>
+              </a:ext>
+            </a:extLst>
+          </p:cNvPr>
+          <p:cNvSpPr txBox="1"/>
+          <p:nvPr/>
+        </p:nvSpPr>
+        <p:spPr>
+          <a:xfrm>
+            <a:off x="3729877" y="2813729"/>
+            <a:ext cx="1543573" cy="646331"/>
+          </a:xfrm>
+          <a:prstGeom prst="rect">
+            <a:avLst/>
+          </a:prstGeom>
+          <a:solidFill>
+            <a:schemeClr val="accent4">
+              <a:lumMod val="20000"/>
+              <a:lumOff val="80000"/>
+            </a:schemeClr>
+          </a:solidFill>
+          <a:ln w="19050">
             <a:solidFill>
-              <a:schemeClr val="accent1">
-                <a:lumMod val="20000"/>
-                <a:lumOff val="80000"/>
+              <a:schemeClr val="bg2">
+                <a:lumMod val="25000"/>
               </a:schemeClr>
             </a:solidFill>
-            <a:ln>
-              <a:solidFill>
-                <a:schemeClr val="bg2">
-                  <a:lumMod val="25000"/>
-                </a:schemeClr>
-              </a:solidFill>
-            </a:ln>
-          </p:spPr>
-          <p:txBody>
-            <a:bodyPr wrap="square" rtlCol="0">
-              <a:spAutoFit/>
-            </a:bodyPr>
-            <a:lstStyle/>
-            <a:p>
-              <a:pPr algn="ctr"/>
-              <a:r>
-                <a:rPr lang="en-CA" dirty="0"/>
-                <a:t>Regurgitation</a:t>
-              </a:r>
-              <a:endParaRPr lang="en-US" dirty="0"/>
-            </a:p>
-          </p:txBody>
-        </p:sp>
-        <p:cxnSp>
-          <p:nvCxnSpPr>
-            <p:cNvPr id="23" name="Straight Arrow Connector 22">
-              <a:extLst>
-                <a:ext uri="{FF2B5EF4-FFF2-40B4-BE49-F238E27FC236}">
-                  <a16:creationId xmlns:a16="http://schemas.microsoft.com/office/drawing/2014/main" id="{11BAC949-310E-78A8-1863-0EB97D58511F}"/>
-                </a:ext>
-              </a:extLst>
-            </p:cNvPr>
-            <p:cNvCxnSpPr>
-              <a:cxnSpLocks/>
-              <a:stCxn id="16" idx="2"/>
-              <a:endCxn id="7" idx="0"/>
-            </p:cNvCxnSpPr>
-            <p:nvPr/>
-          </p:nvCxnSpPr>
-          <p:spPr>
-            <a:xfrm>
-              <a:off x="7567683" y="1975779"/>
-              <a:ext cx="357277" cy="1750995"/>
-            </a:xfrm>
-            <a:prstGeom prst="straightConnector1">
-              <a:avLst/>
-            </a:prstGeom>
-            <a:ln w="15875">
-              <a:tailEnd type="triangle" w="lg" len="lg"/>
-            </a:ln>
-          </p:spPr>
-          <p:style>
-            <a:lnRef idx="2">
-              <a:schemeClr val="dk1"/>
-            </a:lnRef>
-            <a:fillRef idx="0">
-              <a:schemeClr val="dk1"/>
-            </a:fillRef>
-            <a:effectRef idx="1">
-              <a:schemeClr val="dk1"/>
-            </a:effectRef>
-            <a:fontRef idx="minor">
-              <a:schemeClr val="tx1"/>
-            </a:fontRef>
-          </p:style>
-        </p:cxnSp>
-        <p:cxnSp>
-          <p:nvCxnSpPr>
-            <p:cNvPr id="26" name="Straight Arrow Connector 25">
-              <a:extLst>
-                <a:ext uri="{FF2B5EF4-FFF2-40B4-BE49-F238E27FC236}">
-                  <a16:creationId xmlns:a16="http://schemas.microsoft.com/office/drawing/2014/main" id="{54C33C40-7BFE-2E0B-351C-DC57436F5B51}"/>
-                </a:ext>
-              </a:extLst>
-            </p:cNvPr>
-            <p:cNvCxnSpPr>
-              <a:cxnSpLocks/>
-              <a:stCxn id="14" idx="2"/>
-              <a:endCxn id="7" idx="0"/>
-            </p:cNvCxnSpPr>
-            <p:nvPr/>
-          </p:nvCxnSpPr>
-          <p:spPr>
-            <a:xfrm flipH="1">
-              <a:off x="7924960" y="2695548"/>
-              <a:ext cx="2259447" cy="1031226"/>
-            </a:xfrm>
-            <a:prstGeom prst="straightConnector1">
-              <a:avLst/>
-            </a:prstGeom>
-            <a:ln w="15875">
-              <a:tailEnd type="triangle" w="lg" len="lg"/>
-            </a:ln>
-          </p:spPr>
-          <p:style>
-            <a:lnRef idx="2">
-              <a:schemeClr val="dk1"/>
-            </a:lnRef>
-            <a:fillRef idx="0">
-              <a:schemeClr val="dk1"/>
-            </a:fillRef>
-            <a:effectRef idx="1">
-              <a:schemeClr val="dk1"/>
-            </a:effectRef>
-            <a:fontRef idx="minor">
-              <a:schemeClr val="tx1"/>
-            </a:fontRef>
-          </p:style>
-        </p:cxnSp>
-        <p:cxnSp>
-          <p:nvCxnSpPr>
-            <p:cNvPr id="37" name="Straight Arrow Connector 36">
-              <a:extLst>
-                <a:ext uri="{FF2B5EF4-FFF2-40B4-BE49-F238E27FC236}">
-                  <a16:creationId xmlns:a16="http://schemas.microsoft.com/office/drawing/2014/main" id="{98220011-8F92-88DB-2D08-5AD3C3C0AAC5}"/>
-                </a:ext>
-              </a:extLst>
-            </p:cNvPr>
-            <p:cNvCxnSpPr>
-              <a:cxnSpLocks/>
-              <a:stCxn id="12" idx="2"/>
-              <a:endCxn id="7" idx="0"/>
-            </p:cNvCxnSpPr>
-            <p:nvPr/>
-          </p:nvCxnSpPr>
-          <p:spPr>
-            <a:xfrm flipH="1">
-              <a:off x="7924960" y="2098962"/>
-              <a:ext cx="1119454" cy="1627812"/>
-            </a:xfrm>
-            <a:prstGeom prst="straightConnector1">
-              <a:avLst/>
-            </a:prstGeom>
-            <a:ln w="15875">
-              <a:tailEnd type="triangle" w="lg" len="lg"/>
-            </a:ln>
-          </p:spPr>
-          <p:style>
-            <a:lnRef idx="2">
-              <a:schemeClr val="dk1"/>
-            </a:lnRef>
-            <a:fillRef idx="0">
-              <a:schemeClr val="dk1"/>
-            </a:fillRef>
-            <a:effectRef idx="1">
-              <a:schemeClr val="dk1"/>
-            </a:effectRef>
-            <a:fontRef idx="minor">
-              <a:schemeClr val="tx1"/>
-            </a:fontRef>
-          </p:style>
-        </p:cxnSp>
-        <p:cxnSp>
-          <p:nvCxnSpPr>
-            <p:cNvPr id="46" name="Straight Arrow Connector 45">
-              <a:extLst>
-                <a:ext uri="{FF2B5EF4-FFF2-40B4-BE49-F238E27FC236}">
-                  <a16:creationId xmlns:a16="http://schemas.microsoft.com/office/drawing/2014/main" id="{E44A5FBA-5BE9-B3E5-BBF7-466BC7B73B5C}"/>
-                </a:ext>
-              </a:extLst>
-            </p:cNvPr>
-            <p:cNvCxnSpPr>
-              <a:cxnSpLocks/>
-              <a:stCxn id="20" idx="2"/>
-              <a:endCxn id="6" idx="0"/>
-            </p:cNvCxnSpPr>
-            <p:nvPr/>
-          </p:nvCxnSpPr>
-          <p:spPr>
-            <a:xfrm>
-              <a:off x="5343431" y="3022830"/>
-              <a:ext cx="1078" cy="561328"/>
-            </a:xfrm>
-            <a:prstGeom prst="straightConnector1">
-              <a:avLst/>
-            </a:prstGeom>
-            <a:ln w="15875">
-              <a:tailEnd type="triangle" w="lg" len="lg"/>
-            </a:ln>
-          </p:spPr>
-          <p:style>
-            <a:lnRef idx="2">
-              <a:schemeClr val="dk1"/>
-            </a:lnRef>
-            <a:fillRef idx="0">
-              <a:schemeClr val="dk1"/>
-            </a:fillRef>
-            <a:effectRef idx="1">
-              <a:schemeClr val="dk1"/>
-            </a:effectRef>
-            <a:fontRef idx="minor">
-              <a:schemeClr val="tx1"/>
-            </a:fontRef>
-          </p:style>
-        </p:cxnSp>
-        <p:cxnSp>
-          <p:nvCxnSpPr>
-            <p:cNvPr id="55" name="Straight Arrow Connector 54">
-              <a:extLst>
-                <a:ext uri="{FF2B5EF4-FFF2-40B4-BE49-F238E27FC236}">
-                  <a16:creationId xmlns:a16="http://schemas.microsoft.com/office/drawing/2014/main" id="{B27EB1ED-B259-DACE-9B3E-E60C4A109BE4}"/>
-                </a:ext>
-              </a:extLst>
-            </p:cNvPr>
-            <p:cNvCxnSpPr>
-              <a:cxnSpLocks/>
-              <a:stCxn id="21" idx="0"/>
-              <a:endCxn id="6" idx="2"/>
-            </p:cNvCxnSpPr>
-            <p:nvPr/>
-          </p:nvCxnSpPr>
-          <p:spPr>
-            <a:xfrm flipV="1">
-              <a:off x="5341407" y="4230489"/>
-              <a:ext cx="3102" cy="555437"/>
-            </a:xfrm>
-            <a:prstGeom prst="straightConnector1">
-              <a:avLst/>
-            </a:prstGeom>
-            <a:ln w="15875">
-              <a:tailEnd type="triangle" w="lg" len="lg"/>
-            </a:ln>
-          </p:spPr>
-          <p:style>
-            <a:lnRef idx="2">
-              <a:schemeClr val="dk1"/>
-            </a:lnRef>
-            <a:fillRef idx="0">
-              <a:schemeClr val="dk1"/>
-            </a:fillRef>
-            <a:effectRef idx="1">
-              <a:schemeClr val="dk1"/>
-            </a:effectRef>
-            <a:fontRef idx="minor">
-              <a:schemeClr val="tx1"/>
-            </a:fontRef>
-          </p:style>
-        </p:cxnSp>
-        <p:cxnSp>
-          <p:nvCxnSpPr>
-            <p:cNvPr id="142" name="Straight Arrow Connector 141">
-              <a:extLst>
-                <a:ext uri="{FF2B5EF4-FFF2-40B4-BE49-F238E27FC236}">
-                  <a16:creationId xmlns:a16="http://schemas.microsoft.com/office/drawing/2014/main" id="{9B6AEB70-FFB6-A829-2822-64A0C099EB12}"/>
-                </a:ext>
-              </a:extLst>
-            </p:cNvPr>
-            <p:cNvCxnSpPr>
-              <a:cxnSpLocks/>
-              <a:stCxn id="18" idx="0"/>
-              <a:endCxn id="7" idx="2"/>
-            </p:cNvCxnSpPr>
-            <p:nvPr/>
-          </p:nvCxnSpPr>
-          <p:spPr>
-            <a:xfrm flipH="1" flipV="1">
-              <a:off x="7924960" y="4096106"/>
-              <a:ext cx="1852130" cy="689820"/>
-            </a:xfrm>
-            <a:prstGeom prst="straightConnector1">
-              <a:avLst/>
-            </a:prstGeom>
-            <a:ln w="15875">
-              <a:tailEnd type="triangle" w="lg" len="lg"/>
-            </a:ln>
-          </p:spPr>
-          <p:style>
-            <a:lnRef idx="2">
-              <a:schemeClr val="dk1"/>
-            </a:lnRef>
-            <a:fillRef idx="0">
-              <a:schemeClr val="dk1"/>
-            </a:fillRef>
-            <a:effectRef idx="1">
-              <a:schemeClr val="dk1"/>
-            </a:effectRef>
-            <a:fontRef idx="minor">
-              <a:schemeClr val="tx1"/>
-            </a:fontRef>
-          </p:style>
-        </p:cxnSp>
-        <p:cxnSp>
-          <p:nvCxnSpPr>
-            <p:cNvPr id="148" name="Straight Arrow Connector 147">
-              <a:extLst>
-                <a:ext uri="{FF2B5EF4-FFF2-40B4-BE49-F238E27FC236}">
-                  <a16:creationId xmlns:a16="http://schemas.microsoft.com/office/drawing/2014/main" id="{93A37888-A933-6C84-213E-CCC4FDA1FD3E}"/>
-                </a:ext>
-              </a:extLst>
-            </p:cNvPr>
-            <p:cNvCxnSpPr>
-              <a:cxnSpLocks/>
-              <a:stCxn id="51" idx="0"/>
-              <a:endCxn id="18" idx="2"/>
-            </p:cNvCxnSpPr>
-            <p:nvPr/>
-          </p:nvCxnSpPr>
-          <p:spPr>
-            <a:xfrm flipV="1">
-              <a:off x="8863748" y="5155258"/>
-              <a:ext cx="913342" cy="762872"/>
-            </a:xfrm>
-            <a:prstGeom prst="straightConnector1">
-              <a:avLst/>
-            </a:prstGeom>
-            <a:ln w="15875">
-              <a:tailEnd type="triangle" w="lg" len="lg"/>
-            </a:ln>
-          </p:spPr>
-          <p:style>
-            <a:lnRef idx="2">
-              <a:schemeClr val="dk1"/>
-            </a:lnRef>
-            <a:fillRef idx="0">
-              <a:schemeClr val="dk1"/>
-            </a:fillRef>
-            <a:effectRef idx="1">
-              <a:schemeClr val="dk1"/>
-            </a:effectRef>
-            <a:fontRef idx="minor">
-              <a:schemeClr val="tx1"/>
-            </a:fontRef>
-          </p:style>
-        </p:cxnSp>
-      </p:grpSp>
+          </a:ln>
+        </p:spPr>
+        <p:txBody>
+          <a:bodyPr wrap="square" rtlCol="0">
+            <a:spAutoFit/>
+          </a:bodyPr>
+          <a:lstStyle/>
+          <a:p>
+            <a:pPr algn="ctr"/>
+            <a:r>
+              <a:rPr lang="en-CA" dirty="0"/>
+              <a:t>Observed weight</a:t>
+            </a:r>
+            <a:endParaRPr lang="en-US" dirty="0"/>
+          </a:p>
+        </p:txBody>
+      </p:sp>
+      <p:sp>
+        <p:nvSpPr>
+          <p:cNvPr id="7" name="TextBox 6">
+            <a:extLst>
+              <a:ext uri="{FF2B5EF4-FFF2-40B4-BE49-F238E27FC236}">
+                <a16:creationId xmlns:a16="http://schemas.microsoft.com/office/drawing/2014/main" id="{66D899FF-E46B-4C4C-F564-CDB242385069}"/>
+              </a:ext>
+            </a:extLst>
+          </p:cNvPr>
+          <p:cNvSpPr txBox="1"/>
+          <p:nvPr/>
+        </p:nvSpPr>
+        <p:spPr>
+          <a:xfrm>
+            <a:off x="7423614" y="2780955"/>
+            <a:ext cx="1255594" cy="646331"/>
+          </a:xfrm>
+          <a:prstGeom prst="rect">
+            <a:avLst/>
+          </a:prstGeom>
+          <a:solidFill>
+            <a:schemeClr val="accent6">
+              <a:lumMod val="40000"/>
+              <a:lumOff val="60000"/>
+            </a:schemeClr>
+          </a:solidFill>
+          <a:ln w="19050">
+            <a:solidFill>
+              <a:schemeClr val="bg2">
+                <a:lumMod val="25000"/>
+              </a:schemeClr>
+            </a:solidFill>
+          </a:ln>
+        </p:spPr>
+        <p:txBody>
+          <a:bodyPr wrap="square" rtlCol="0">
+            <a:spAutoFit/>
+          </a:bodyPr>
+          <a:lstStyle/>
+          <a:p>
+            <a:pPr algn="ctr"/>
+            <a:r>
+              <a:rPr lang="en-CA" dirty="0"/>
+              <a:t>True weight</a:t>
+            </a:r>
+            <a:endParaRPr lang="en-US" dirty="0"/>
+          </a:p>
+        </p:txBody>
+      </p:sp>
+      <p:sp>
+        <p:nvSpPr>
+          <p:cNvPr id="31" name="TextBox 30">
+            <a:extLst>
+              <a:ext uri="{FF2B5EF4-FFF2-40B4-BE49-F238E27FC236}">
+                <a16:creationId xmlns:a16="http://schemas.microsoft.com/office/drawing/2014/main" id="{E6B6F01B-8F36-5C5B-7DFF-9286FFACB9B3}"/>
+              </a:ext>
+            </a:extLst>
+          </p:cNvPr>
+          <p:cNvSpPr txBox="1"/>
+          <p:nvPr/>
+        </p:nvSpPr>
+        <p:spPr>
+          <a:xfrm>
+            <a:off x="7563435" y="1880642"/>
+            <a:ext cx="975952" cy="646331"/>
+          </a:xfrm>
+          <a:prstGeom prst="rect">
+            <a:avLst/>
+          </a:prstGeom>
+          <a:solidFill>
+            <a:srgbClr val="C5E0B4"/>
+          </a:solidFill>
+          <a:ln w="19050">
+            <a:solidFill>
+              <a:schemeClr val="bg2">
+                <a:lumMod val="25000"/>
+              </a:schemeClr>
+            </a:solidFill>
+          </a:ln>
+        </p:spPr>
+        <p:txBody>
+          <a:bodyPr wrap="square" rtlCol="0">
+            <a:spAutoFit/>
+          </a:bodyPr>
+          <a:lstStyle/>
+          <a:p>
+            <a:pPr algn="ctr"/>
+            <a:r>
+              <a:rPr lang="en-CA" dirty="0"/>
+              <a:t>True size</a:t>
+            </a:r>
+            <a:endParaRPr lang="en-US" dirty="0"/>
+          </a:p>
+        </p:txBody>
+      </p:sp>
+      <p:cxnSp>
+        <p:nvCxnSpPr>
+          <p:cNvPr id="32" name="Straight Arrow Connector 31">
+            <a:extLst>
+              <a:ext uri="{FF2B5EF4-FFF2-40B4-BE49-F238E27FC236}">
+                <a16:creationId xmlns:a16="http://schemas.microsoft.com/office/drawing/2014/main" id="{963423FB-626C-B51C-CDDA-F5ADB2F085E3}"/>
+              </a:ext>
+            </a:extLst>
+          </p:cNvPr>
+          <p:cNvCxnSpPr>
+            <a:cxnSpLocks/>
+            <a:stCxn id="31" idx="2"/>
+            <a:endCxn id="7" idx="0"/>
+          </p:cNvCxnSpPr>
+          <p:nvPr/>
+        </p:nvCxnSpPr>
+        <p:spPr>
+          <a:xfrm>
+            <a:off x="8051411" y="2526973"/>
+            <a:ext cx="0" cy="253982"/>
+          </a:xfrm>
+          <a:prstGeom prst="straightConnector1">
+            <a:avLst/>
+          </a:prstGeom>
+          <a:ln w="15875">
+            <a:tailEnd type="triangle" w="lg" len="lg"/>
+          </a:ln>
+        </p:spPr>
+        <p:style>
+          <a:lnRef idx="2">
+            <a:schemeClr val="dk1"/>
+          </a:lnRef>
+          <a:fillRef idx="0">
+            <a:schemeClr val="dk1"/>
+          </a:fillRef>
+          <a:effectRef idx="1">
+            <a:schemeClr val="dk1"/>
+          </a:effectRef>
+          <a:fontRef idx="minor">
+            <a:schemeClr val="tx1"/>
+          </a:fontRef>
+        </p:style>
+      </p:cxnSp>
+      <p:cxnSp>
+        <p:nvCxnSpPr>
+          <p:cNvPr id="35" name="Straight Arrow Connector 34">
+            <a:extLst>
+              <a:ext uri="{FF2B5EF4-FFF2-40B4-BE49-F238E27FC236}">
+                <a16:creationId xmlns:a16="http://schemas.microsoft.com/office/drawing/2014/main" id="{E3A77B78-BE9E-B10F-2478-7F4E8AE0C8A6}"/>
+              </a:ext>
+            </a:extLst>
+          </p:cNvPr>
+          <p:cNvCxnSpPr>
+            <a:cxnSpLocks/>
+            <a:stCxn id="7" idx="1"/>
+            <a:endCxn id="6" idx="3"/>
+          </p:cNvCxnSpPr>
+          <p:nvPr/>
+        </p:nvCxnSpPr>
+        <p:spPr>
+          <a:xfrm flipH="1">
+            <a:off x="5273450" y="3104121"/>
+            <a:ext cx="2150164" cy="32774"/>
+          </a:xfrm>
+          <a:prstGeom prst="straightConnector1">
+            <a:avLst/>
+          </a:prstGeom>
+          <a:ln w="15875">
+            <a:tailEnd type="triangle" w="lg" len="lg"/>
+          </a:ln>
+        </p:spPr>
+        <p:style>
+          <a:lnRef idx="2">
+            <a:schemeClr val="dk1"/>
+          </a:lnRef>
+          <a:fillRef idx="0">
+            <a:schemeClr val="dk1"/>
+          </a:fillRef>
+          <a:effectRef idx="1">
+            <a:schemeClr val="dk1"/>
+          </a:effectRef>
+          <a:fontRef idx="minor">
+            <a:schemeClr val="tx1"/>
+          </a:fontRef>
+        </p:style>
+      </p:cxnSp>
+      <p:sp>
+        <p:nvSpPr>
+          <p:cNvPr id="51" name="TextBox 50">
+            <a:extLst>
+              <a:ext uri="{FF2B5EF4-FFF2-40B4-BE49-F238E27FC236}">
+                <a16:creationId xmlns:a16="http://schemas.microsoft.com/office/drawing/2014/main" id="{78A80040-1A25-9E7B-7613-FB60C487818D}"/>
+              </a:ext>
+            </a:extLst>
+          </p:cNvPr>
+          <p:cNvSpPr txBox="1"/>
+          <p:nvPr/>
+        </p:nvSpPr>
+        <p:spPr>
+          <a:xfrm>
+            <a:off x="9115687" y="4070439"/>
+            <a:ext cx="1255594" cy="369332"/>
+          </a:xfrm>
+          <a:prstGeom prst="rect">
+            <a:avLst/>
+          </a:prstGeom>
+          <a:solidFill>
+            <a:schemeClr val="accent1">
+              <a:lumMod val="20000"/>
+              <a:lumOff val="80000"/>
+            </a:schemeClr>
+          </a:solidFill>
+          <a:ln>
+            <a:solidFill>
+              <a:schemeClr val="bg2">
+                <a:lumMod val="25000"/>
+              </a:schemeClr>
+            </a:solidFill>
+          </a:ln>
+        </p:spPr>
+        <p:txBody>
+          <a:bodyPr wrap="square" rtlCol="0">
+            <a:spAutoFit/>
+          </a:bodyPr>
+          <a:lstStyle/>
+          <a:p>
+            <a:pPr algn="ctr"/>
+            <a:r>
+              <a:rPr lang="en-CA" dirty="0"/>
+              <a:t>Disease</a:t>
+            </a:r>
+            <a:endParaRPr lang="en-US" dirty="0"/>
+          </a:p>
+        </p:txBody>
+      </p:sp>
+      <p:sp>
+        <p:nvSpPr>
+          <p:cNvPr id="52" name="TextBox 51">
+            <a:extLst>
+              <a:ext uri="{FF2B5EF4-FFF2-40B4-BE49-F238E27FC236}">
+                <a16:creationId xmlns:a16="http://schemas.microsoft.com/office/drawing/2014/main" id="{2A125DB6-35AB-031A-1DDB-BE3284CB6188}"/>
+              </a:ext>
+            </a:extLst>
+          </p:cNvPr>
+          <p:cNvSpPr txBox="1"/>
+          <p:nvPr/>
+        </p:nvSpPr>
+        <p:spPr>
+          <a:xfrm>
+            <a:off x="7436225" y="3696223"/>
+            <a:ext cx="1255594" cy="646331"/>
+          </a:xfrm>
+          <a:prstGeom prst="rect">
+            <a:avLst/>
+          </a:prstGeom>
+          <a:solidFill>
+            <a:schemeClr val="accent1">
+              <a:lumMod val="20000"/>
+              <a:lumOff val="80000"/>
+            </a:schemeClr>
+          </a:solidFill>
+          <a:ln>
+            <a:solidFill>
+              <a:schemeClr val="bg2">
+                <a:lumMod val="25000"/>
+              </a:schemeClr>
+            </a:solidFill>
+          </a:ln>
+        </p:spPr>
+        <p:txBody>
+          <a:bodyPr wrap="square" rtlCol="0">
+            <a:spAutoFit/>
+          </a:bodyPr>
+          <a:lstStyle/>
+          <a:p>
+            <a:pPr algn="ctr"/>
+            <a:r>
+              <a:rPr lang="en-CA" dirty="0"/>
+              <a:t>Health Condition</a:t>
+            </a:r>
+            <a:endParaRPr lang="en-US" dirty="0"/>
+          </a:p>
+        </p:txBody>
+      </p:sp>
+      <p:sp>
+        <p:nvSpPr>
+          <p:cNvPr id="53" name="TextBox 52">
+            <a:extLst>
+              <a:ext uri="{FF2B5EF4-FFF2-40B4-BE49-F238E27FC236}">
+                <a16:creationId xmlns:a16="http://schemas.microsoft.com/office/drawing/2014/main" id="{8C213A89-C677-95D2-4F22-86C512369243}"/>
+              </a:ext>
+            </a:extLst>
+          </p:cNvPr>
+          <p:cNvSpPr txBox="1"/>
+          <p:nvPr/>
+        </p:nvSpPr>
+        <p:spPr>
+          <a:xfrm>
+            <a:off x="9115687" y="3488474"/>
+            <a:ext cx="1255594" cy="369332"/>
+          </a:xfrm>
+          <a:prstGeom prst="rect">
+            <a:avLst/>
+          </a:prstGeom>
+          <a:solidFill>
+            <a:schemeClr val="accent1">
+              <a:lumMod val="20000"/>
+              <a:lumOff val="80000"/>
+            </a:schemeClr>
+          </a:solidFill>
+          <a:ln>
+            <a:solidFill>
+              <a:schemeClr val="bg2">
+                <a:lumMod val="25000"/>
+              </a:schemeClr>
+            </a:solidFill>
+          </a:ln>
+        </p:spPr>
+        <p:txBody>
+          <a:bodyPr wrap="square" rtlCol="0">
+            <a:spAutoFit/>
+          </a:bodyPr>
+          <a:lstStyle/>
+          <a:p>
+            <a:pPr algn="ctr"/>
+            <a:r>
+              <a:rPr lang="en-CA" dirty="0"/>
+              <a:t>Food</a:t>
+            </a:r>
+            <a:endParaRPr lang="en-US" dirty="0"/>
+          </a:p>
+        </p:txBody>
+      </p:sp>
+      <p:cxnSp>
+        <p:nvCxnSpPr>
+          <p:cNvPr id="54" name="Straight Arrow Connector 53">
+            <a:extLst>
+              <a:ext uri="{FF2B5EF4-FFF2-40B4-BE49-F238E27FC236}">
+                <a16:creationId xmlns:a16="http://schemas.microsoft.com/office/drawing/2014/main" id="{BB2EDBE4-888C-B516-3C53-65625BE2C6F7}"/>
+              </a:ext>
+            </a:extLst>
+          </p:cNvPr>
+          <p:cNvCxnSpPr>
+            <a:cxnSpLocks/>
+            <a:stCxn id="53" idx="1"/>
+            <a:endCxn id="52" idx="3"/>
+          </p:cNvCxnSpPr>
+          <p:nvPr/>
+        </p:nvCxnSpPr>
+        <p:spPr>
+          <a:xfrm flipH="1">
+            <a:off x="8691819" y="3673140"/>
+            <a:ext cx="423868" cy="346249"/>
+          </a:xfrm>
+          <a:prstGeom prst="straightConnector1">
+            <a:avLst/>
+          </a:prstGeom>
+          <a:ln w="15875">
+            <a:tailEnd type="triangle" w="lg" len="lg"/>
+          </a:ln>
+        </p:spPr>
+        <p:style>
+          <a:lnRef idx="2">
+            <a:schemeClr val="dk1"/>
+          </a:lnRef>
+          <a:fillRef idx="0">
+            <a:schemeClr val="dk1"/>
+          </a:fillRef>
+          <a:effectRef idx="1">
+            <a:schemeClr val="dk1"/>
+          </a:effectRef>
+          <a:fontRef idx="minor">
+            <a:schemeClr val="tx1"/>
+          </a:fontRef>
+        </p:style>
+      </p:cxnSp>
+      <p:cxnSp>
+        <p:nvCxnSpPr>
+          <p:cNvPr id="57" name="Straight Arrow Connector 56">
+            <a:extLst>
+              <a:ext uri="{FF2B5EF4-FFF2-40B4-BE49-F238E27FC236}">
+                <a16:creationId xmlns:a16="http://schemas.microsoft.com/office/drawing/2014/main" id="{C0626B02-C201-B73B-10DF-85F16A3052A9}"/>
+              </a:ext>
+            </a:extLst>
+          </p:cNvPr>
+          <p:cNvCxnSpPr>
+            <a:cxnSpLocks/>
+            <a:stCxn id="51" idx="1"/>
+            <a:endCxn id="52" idx="3"/>
+          </p:cNvCxnSpPr>
+          <p:nvPr/>
+        </p:nvCxnSpPr>
+        <p:spPr>
+          <a:xfrm flipH="1" flipV="1">
+            <a:off x="8691819" y="4019389"/>
+            <a:ext cx="423868" cy="235716"/>
+          </a:xfrm>
+          <a:prstGeom prst="straightConnector1">
+            <a:avLst/>
+          </a:prstGeom>
+          <a:ln w="15875">
+            <a:tailEnd type="triangle" w="lg" len="lg"/>
+          </a:ln>
+        </p:spPr>
+        <p:style>
+          <a:lnRef idx="2">
+            <a:schemeClr val="dk1"/>
+          </a:lnRef>
+          <a:fillRef idx="0">
+            <a:schemeClr val="dk1"/>
+          </a:fillRef>
+          <a:effectRef idx="1">
+            <a:schemeClr val="dk1"/>
+          </a:effectRef>
+          <a:fontRef idx="minor">
+            <a:schemeClr val="tx1"/>
+          </a:fontRef>
+        </p:style>
+      </p:cxnSp>
+      <p:cxnSp>
+        <p:nvCxnSpPr>
+          <p:cNvPr id="73" name="Straight Arrow Connector 72">
+            <a:extLst>
+              <a:ext uri="{FF2B5EF4-FFF2-40B4-BE49-F238E27FC236}">
+                <a16:creationId xmlns:a16="http://schemas.microsoft.com/office/drawing/2014/main" id="{2CD9F0FA-36A9-084D-EB4D-5E4D7D0AE4A8}"/>
+              </a:ext>
+            </a:extLst>
+          </p:cNvPr>
+          <p:cNvCxnSpPr>
+            <a:cxnSpLocks/>
+            <a:stCxn id="52" idx="0"/>
+            <a:endCxn id="7" idx="2"/>
+          </p:cNvCxnSpPr>
+          <p:nvPr/>
+        </p:nvCxnSpPr>
+        <p:spPr>
+          <a:xfrm flipH="1" flipV="1">
+            <a:off x="8051411" y="3427286"/>
+            <a:ext cx="12611" cy="268937"/>
+          </a:xfrm>
+          <a:prstGeom prst="straightConnector1">
+            <a:avLst/>
+          </a:prstGeom>
+          <a:ln w="15875">
+            <a:tailEnd type="triangle" w="lg" len="lg"/>
+          </a:ln>
+        </p:spPr>
+        <p:style>
+          <a:lnRef idx="2">
+            <a:schemeClr val="dk1"/>
+          </a:lnRef>
+          <a:fillRef idx="0">
+            <a:schemeClr val="dk1"/>
+          </a:fillRef>
+          <a:effectRef idx="1">
+            <a:schemeClr val="dk1"/>
+          </a:effectRef>
+          <a:fontRef idx="minor">
+            <a:schemeClr val="tx1"/>
+          </a:fontRef>
+        </p:style>
+      </p:cxnSp>
+      <p:sp>
+        <p:nvSpPr>
+          <p:cNvPr id="165" name="TextBox 164">
+            <a:extLst>
+              <a:ext uri="{FF2B5EF4-FFF2-40B4-BE49-F238E27FC236}">
+                <a16:creationId xmlns:a16="http://schemas.microsoft.com/office/drawing/2014/main" id="{892BB7A8-3637-53C8-832E-E51042C1473A}"/>
+              </a:ext>
+            </a:extLst>
+          </p:cNvPr>
+          <p:cNvSpPr txBox="1"/>
+          <p:nvPr/>
+        </p:nvSpPr>
+        <p:spPr>
+          <a:xfrm>
+            <a:off x="5756763" y="4255105"/>
+            <a:ext cx="1255594" cy="646331"/>
+          </a:xfrm>
+          <a:prstGeom prst="rect">
+            <a:avLst/>
+          </a:prstGeom>
+          <a:solidFill>
+            <a:schemeClr val="accent1">
+              <a:lumMod val="20000"/>
+              <a:lumOff val="80000"/>
+            </a:schemeClr>
+          </a:solidFill>
+          <a:ln>
+            <a:solidFill>
+              <a:schemeClr val="bg2">
+                <a:lumMod val="25000"/>
+              </a:schemeClr>
+            </a:solidFill>
+          </a:ln>
+        </p:spPr>
+        <p:txBody>
+          <a:bodyPr wrap="square" rtlCol="0">
+            <a:spAutoFit/>
+          </a:bodyPr>
+          <a:lstStyle/>
+          <a:p>
+            <a:pPr algn="ctr"/>
+            <a:r>
+              <a:rPr lang="en-CA" dirty="0"/>
+              <a:t>Sea conditions</a:t>
+            </a:r>
+            <a:endParaRPr lang="en-US" dirty="0"/>
+          </a:p>
+        </p:txBody>
+      </p:sp>
+      <p:sp>
+        <p:nvSpPr>
+          <p:cNvPr id="166" name="TextBox 165">
+            <a:extLst>
+              <a:ext uri="{FF2B5EF4-FFF2-40B4-BE49-F238E27FC236}">
+                <a16:creationId xmlns:a16="http://schemas.microsoft.com/office/drawing/2014/main" id="{30DCC95E-0F0A-8B27-D036-E883DB276209}"/>
+              </a:ext>
+            </a:extLst>
+          </p:cNvPr>
+          <p:cNvSpPr txBox="1"/>
+          <p:nvPr/>
+        </p:nvSpPr>
+        <p:spPr>
+          <a:xfrm>
+            <a:off x="5437185" y="3377088"/>
+            <a:ext cx="1869527" cy="369332"/>
+          </a:xfrm>
+          <a:prstGeom prst="rect">
+            <a:avLst/>
+          </a:prstGeom>
+          <a:solidFill>
+            <a:schemeClr val="accent1">
+              <a:lumMod val="20000"/>
+              <a:lumOff val="80000"/>
+            </a:schemeClr>
+          </a:solidFill>
+          <a:ln>
+            <a:solidFill>
+              <a:schemeClr val="bg2">
+                <a:lumMod val="25000"/>
+              </a:schemeClr>
+            </a:solidFill>
+          </a:ln>
+        </p:spPr>
+        <p:txBody>
+          <a:bodyPr wrap="square" rtlCol="0">
+            <a:spAutoFit/>
+          </a:bodyPr>
+          <a:lstStyle/>
+          <a:p>
+            <a:pPr algn="ctr"/>
+            <a:r>
+              <a:rPr lang="en-CA" dirty="0"/>
+              <a:t>Weight precision</a:t>
+            </a:r>
+            <a:endParaRPr lang="en-US" dirty="0"/>
+          </a:p>
+        </p:txBody>
+      </p:sp>
+      <p:cxnSp>
+        <p:nvCxnSpPr>
+          <p:cNvPr id="167" name="Straight Arrow Connector 166">
+            <a:extLst>
+              <a:ext uri="{FF2B5EF4-FFF2-40B4-BE49-F238E27FC236}">
+                <a16:creationId xmlns:a16="http://schemas.microsoft.com/office/drawing/2014/main" id="{7065B2D9-6F22-52BC-4082-046E22CA4374}"/>
+              </a:ext>
+            </a:extLst>
+          </p:cNvPr>
+          <p:cNvCxnSpPr>
+            <a:cxnSpLocks/>
+            <a:stCxn id="165" idx="0"/>
+            <a:endCxn id="166" idx="2"/>
+          </p:cNvCxnSpPr>
+          <p:nvPr/>
+        </p:nvCxnSpPr>
+        <p:spPr>
+          <a:xfrm flipH="1" flipV="1">
+            <a:off x="6371949" y="3746420"/>
+            <a:ext cx="12611" cy="508685"/>
+          </a:xfrm>
+          <a:prstGeom prst="straightConnector1">
+            <a:avLst/>
+          </a:prstGeom>
+          <a:ln w="15875">
+            <a:tailEnd type="triangle" w="lg" len="lg"/>
+          </a:ln>
+        </p:spPr>
+        <p:style>
+          <a:lnRef idx="2">
+            <a:schemeClr val="dk1"/>
+          </a:lnRef>
+          <a:fillRef idx="0">
+            <a:schemeClr val="dk1"/>
+          </a:fillRef>
+          <a:effectRef idx="1">
+            <a:schemeClr val="dk1"/>
+          </a:effectRef>
+          <a:fontRef idx="minor">
+            <a:schemeClr val="tx1"/>
+          </a:fontRef>
+        </p:style>
+      </p:cxnSp>
+      <p:cxnSp>
+        <p:nvCxnSpPr>
+          <p:cNvPr id="170" name="Straight Arrow Connector 169">
+            <a:extLst>
+              <a:ext uri="{FF2B5EF4-FFF2-40B4-BE49-F238E27FC236}">
+                <a16:creationId xmlns:a16="http://schemas.microsoft.com/office/drawing/2014/main" id="{6DD3B0E9-A070-5740-2D57-2CDE78F1FCAC}"/>
+              </a:ext>
+            </a:extLst>
+          </p:cNvPr>
+          <p:cNvCxnSpPr>
+            <a:cxnSpLocks/>
+            <a:stCxn id="166" idx="0"/>
+            <a:endCxn id="6" idx="3"/>
+          </p:cNvCxnSpPr>
+          <p:nvPr/>
+        </p:nvCxnSpPr>
+        <p:spPr>
+          <a:xfrm flipH="1" flipV="1">
+            <a:off x="5273450" y="3136895"/>
+            <a:ext cx="1098499" cy="240193"/>
+          </a:xfrm>
+          <a:prstGeom prst="straightConnector1">
+            <a:avLst/>
+          </a:prstGeom>
+          <a:ln w="15875">
+            <a:tailEnd type="triangle" w="lg" len="lg"/>
+          </a:ln>
+        </p:spPr>
+        <p:style>
+          <a:lnRef idx="2">
+            <a:schemeClr val="dk1"/>
+          </a:lnRef>
+          <a:fillRef idx="0">
+            <a:schemeClr val="dk1"/>
+          </a:fillRef>
+          <a:effectRef idx="1">
+            <a:schemeClr val="dk1"/>
+          </a:effectRef>
+          <a:fontRef idx="minor">
+            <a:schemeClr val="tx1"/>
+          </a:fontRef>
+        </p:style>
+      </p:cxnSp>
+      <p:sp>
+        <p:nvSpPr>
+          <p:cNvPr id="12" name="TextBox 11">
+            <a:extLst>
+              <a:ext uri="{FF2B5EF4-FFF2-40B4-BE49-F238E27FC236}">
+                <a16:creationId xmlns:a16="http://schemas.microsoft.com/office/drawing/2014/main" id="{92B8E69B-3D81-684C-E6BF-18B6451FA5A7}"/>
+              </a:ext>
+            </a:extLst>
+          </p:cNvPr>
+          <p:cNvSpPr txBox="1"/>
+          <p:nvPr/>
+        </p:nvSpPr>
+        <p:spPr>
+          <a:xfrm>
+            <a:off x="9115687" y="2337490"/>
+            <a:ext cx="2161042" cy="369332"/>
+          </a:xfrm>
+          <a:prstGeom prst="rect">
+            <a:avLst/>
+          </a:prstGeom>
+          <a:noFill/>
+          <a:ln>
+            <a:solidFill>
+              <a:schemeClr val="bg2">
+                <a:lumMod val="25000"/>
+              </a:schemeClr>
+            </a:solidFill>
+          </a:ln>
+        </p:spPr>
+        <p:txBody>
+          <a:bodyPr wrap="square" rtlCol="0">
+            <a:spAutoFit/>
+          </a:bodyPr>
+          <a:lstStyle/>
+          <a:p>
+            <a:pPr algn="ctr"/>
+            <a:r>
+              <a:rPr lang="en-CA" dirty="0"/>
+              <a:t>Reproductive status</a:t>
+            </a:r>
+            <a:endParaRPr lang="en-US" dirty="0"/>
+          </a:p>
+        </p:txBody>
+      </p:sp>
+      <p:sp>
+        <p:nvSpPr>
+          <p:cNvPr id="16" name="TextBox 15">
+            <a:extLst>
+              <a:ext uri="{FF2B5EF4-FFF2-40B4-BE49-F238E27FC236}">
+                <a16:creationId xmlns:a16="http://schemas.microsoft.com/office/drawing/2014/main" id="{B6F529A3-85A8-AEDC-B322-86F50171AD0C}"/>
+              </a:ext>
+            </a:extLst>
+          </p:cNvPr>
+          <p:cNvSpPr txBox="1"/>
+          <p:nvPr/>
+        </p:nvSpPr>
+        <p:spPr>
+          <a:xfrm>
+            <a:off x="9115687" y="2906509"/>
+            <a:ext cx="1013806" cy="369332"/>
+          </a:xfrm>
+          <a:prstGeom prst="rect">
+            <a:avLst/>
+          </a:prstGeom>
+          <a:noFill/>
+          <a:ln>
+            <a:solidFill>
+              <a:schemeClr val="bg2">
+                <a:lumMod val="25000"/>
+              </a:schemeClr>
+            </a:solidFill>
+          </a:ln>
+        </p:spPr>
+        <p:txBody>
+          <a:bodyPr wrap="square" rtlCol="0">
+            <a:spAutoFit/>
+          </a:bodyPr>
+          <a:lstStyle/>
+          <a:p>
+            <a:pPr algn="ctr"/>
+            <a:r>
+              <a:rPr lang="en-CA" dirty="0"/>
+              <a:t>Sex</a:t>
+            </a:r>
+            <a:endParaRPr lang="en-US" dirty="0"/>
+          </a:p>
+        </p:txBody>
+      </p:sp>
+      <p:sp>
+        <p:nvSpPr>
+          <p:cNvPr id="20" name="TextBox 19">
+            <a:extLst>
+              <a:ext uri="{FF2B5EF4-FFF2-40B4-BE49-F238E27FC236}">
+                <a16:creationId xmlns:a16="http://schemas.microsoft.com/office/drawing/2014/main" id="{77D88D10-E935-8242-A9A8-E8E057C9C66A}"/>
+              </a:ext>
+            </a:extLst>
+          </p:cNvPr>
+          <p:cNvSpPr txBox="1"/>
+          <p:nvPr/>
+        </p:nvSpPr>
+        <p:spPr>
+          <a:xfrm>
+            <a:off x="1364233" y="2698685"/>
+            <a:ext cx="1543573" cy="369332"/>
+          </a:xfrm>
+          <a:prstGeom prst="rect">
+            <a:avLst/>
+          </a:prstGeom>
+          <a:solidFill>
+            <a:schemeClr val="accent1">
+              <a:lumMod val="20000"/>
+              <a:lumOff val="80000"/>
+            </a:schemeClr>
+          </a:solidFill>
+          <a:ln>
+            <a:solidFill>
+              <a:schemeClr val="bg2">
+                <a:lumMod val="25000"/>
+              </a:schemeClr>
+            </a:solidFill>
+          </a:ln>
+        </p:spPr>
+        <p:txBody>
+          <a:bodyPr wrap="square" rtlCol="0">
+            <a:spAutoFit/>
+          </a:bodyPr>
+          <a:lstStyle/>
+          <a:p>
+            <a:pPr algn="ctr"/>
+            <a:r>
+              <a:rPr lang="en-CA" dirty="0"/>
+              <a:t>Damage</a:t>
+            </a:r>
+            <a:endParaRPr lang="en-US" dirty="0"/>
+          </a:p>
+        </p:txBody>
+      </p:sp>
+      <p:sp>
+        <p:nvSpPr>
+          <p:cNvPr id="21" name="TextBox 20">
+            <a:extLst>
+              <a:ext uri="{FF2B5EF4-FFF2-40B4-BE49-F238E27FC236}">
+                <a16:creationId xmlns:a16="http://schemas.microsoft.com/office/drawing/2014/main" id="{43FCCED7-537D-3E59-3224-122D4832B6C5}"/>
+              </a:ext>
+            </a:extLst>
+          </p:cNvPr>
+          <p:cNvSpPr txBox="1"/>
+          <p:nvPr/>
+        </p:nvSpPr>
+        <p:spPr>
+          <a:xfrm>
+            <a:off x="1364235" y="3368470"/>
+            <a:ext cx="1543572" cy="369332"/>
+          </a:xfrm>
+          <a:prstGeom prst="rect">
+            <a:avLst/>
+          </a:prstGeom>
+          <a:solidFill>
+            <a:schemeClr val="accent1">
+              <a:lumMod val="20000"/>
+              <a:lumOff val="80000"/>
+            </a:schemeClr>
+          </a:solidFill>
+          <a:ln>
+            <a:solidFill>
+              <a:schemeClr val="bg2">
+                <a:lumMod val="25000"/>
+              </a:schemeClr>
+            </a:solidFill>
+          </a:ln>
+        </p:spPr>
+        <p:txBody>
+          <a:bodyPr wrap="square" rtlCol="0">
+            <a:spAutoFit/>
+          </a:bodyPr>
+          <a:lstStyle/>
+          <a:p>
+            <a:pPr algn="ctr"/>
+            <a:r>
+              <a:rPr lang="en-CA" dirty="0"/>
+              <a:t>Regurgitation</a:t>
+            </a:r>
+            <a:endParaRPr lang="en-US" dirty="0"/>
+          </a:p>
+        </p:txBody>
+      </p:sp>
+      <p:cxnSp>
+        <p:nvCxnSpPr>
+          <p:cNvPr id="23" name="Straight Arrow Connector 22">
+            <a:extLst>
+              <a:ext uri="{FF2B5EF4-FFF2-40B4-BE49-F238E27FC236}">
+                <a16:creationId xmlns:a16="http://schemas.microsoft.com/office/drawing/2014/main" id="{11BAC949-310E-78A8-1863-0EB97D58511F}"/>
+              </a:ext>
+            </a:extLst>
+          </p:cNvPr>
+          <p:cNvCxnSpPr>
+            <a:cxnSpLocks/>
+            <a:stCxn id="16" idx="1"/>
+            <a:endCxn id="7" idx="3"/>
+          </p:cNvCxnSpPr>
+          <p:nvPr/>
+        </p:nvCxnSpPr>
+        <p:spPr>
+          <a:xfrm flipH="1">
+            <a:off x="8679208" y="3091175"/>
+            <a:ext cx="436479" cy="12946"/>
+          </a:xfrm>
+          <a:prstGeom prst="straightConnector1">
+            <a:avLst/>
+          </a:prstGeom>
+          <a:ln w="15875">
+            <a:tailEnd type="triangle" w="lg" len="lg"/>
+          </a:ln>
+        </p:spPr>
+        <p:style>
+          <a:lnRef idx="2">
+            <a:schemeClr val="dk1"/>
+          </a:lnRef>
+          <a:fillRef idx="0">
+            <a:schemeClr val="dk1"/>
+          </a:fillRef>
+          <a:effectRef idx="1">
+            <a:schemeClr val="dk1"/>
+          </a:effectRef>
+          <a:fontRef idx="minor">
+            <a:schemeClr val="tx1"/>
+          </a:fontRef>
+        </p:style>
+      </p:cxnSp>
+      <p:cxnSp>
+        <p:nvCxnSpPr>
+          <p:cNvPr id="37" name="Straight Arrow Connector 36">
+            <a:extLst>
+              <a:ext uri="{FF2B5EF4-FFF2-40B4-BE49-F238E27FC236}">
+                <a16:creationId xmlns:a16="http://schemas.microsoft.com/office/drawing/2014/main" id="{98220011-8F92-88DB-2D08-5AD3C3C0AAC5}"/>
+              </a:ext>
+            </a:extLst>
+          </p:cNvPr>
+          <p:cNvCxnSpPr>
+            <a:cxnSpLocks/>
+            <a:stCxn id="12" idx="1"/>
+            <a:endCxn id="7" idx="3"/>
+          </p:cNvCxnSpPr>
+          <p:nvPr/>
+        </p:nvCxnSpPr>
+        <p:spPr>
+          <a:xfrm flipH="1">
+            <a:off x="8679208" y="2522156"/>
+            <a:ext cx="436479" cy="581965"/>
+          </a:xfrm>
+          <a:prstGeom prst="straightConnector1">
+            <a:avLst/>
+          </a:prstGeom>
+          <a:ln w="15875">
+            <a:tailEnd type="triangle" w="lg" len="lg"/>
+          </a:ln>
+        </p:spPr>
+        <p:style>
+          <a:lnRef idx="2">
+            <a:schemeClr val="dk1"/>
+          </a:lnRef>
+          <a:fillRef idx="0">
+            <a:schemeClr val="dk1"/>
+          </a:fillRef>
+          <a:effectRef idx="1">
+            <a:schemeClr val="dk1"/>
+          </a:effectRef>
+          <a:fontRef idx="minor">
+            <a:schemeClr val="tx1"/>
+          </a:fontRef>
+        </p:style>
+      </p:cxnSp>
+      <p:cxnSp>
+        <p:nvCxnSpPr>
+          <p:cNvPr id="46" name="Straight Arrow Connector 45">
+            <a:extLst>
+              <a:ext uri="{FF2B5EF4-FFF2-40B4-BE49-F238E27FC236}">
+                <a16:creationId xmlns:a16="http://schemas.microsoft.com/office/drawing/2014/main" id="{E44A5FBA-5BE9-B3E5-BBF7-466BC7B73B5C}"/>
+              </a:ext>
+            </a:extLst>
+          </p:cNvPr>
+          <p:cNvCxnSpPr>
+            <a:cxnSpLocks/>
+            <a:stCxn id="20" idx="3"/>
+            <a:endCxn id="6" idx="1"/>
+          </p:cNvCxnSpPr>
+          <p:nvPr/>
+        </p:nvCxnSpPr>
+        <p:spPr>
+          <a:xfrm>
+            <a:off x="2907806" y="2883351"/>
+            <a:ext cx="822071" cy="253544"/>
+          </a:xfrm>
+          <a:prstGeom prst="straightConnector1">
+            <a:avLst/>
+          </a:prstGeom>
+          <a:ln w="15875">
+            <a:tailEnd type="triangle" w="lg" len="lg"/>
+          </a:ln>
+        </p:spPr>
+        <p:style>
+          <a:lnRef idx="2">
+            <a:schemeClr val="dk1"/>
+          </a:lnRef>
+          <a:fillRef idx="0">
+            <a:schemeClr val="dk1"/>
+          </a:fillRef>
+          <a:effectRef idx="1">
+            <a:schemeClr val="dk1"/>
+          </a:effectRef>
+          <a:fontRef idx="minor">
+            <a:schemeClr val="tx1"/>
+          </a:fontRef>
+        </p:style>
+      </p:cxnSp>
+      <p:cxnSp>
+        <p:nvCxnSpPr>
+          <p:cNvPr id="55" name="Straight Arrow Connector 54">
+            <a:extLst>
+              <a:ext uri="{FF2B5EF4-FFF2-40B4-BE49-F238E27FC236}">
+                <a16:creationId xmlns:a16="http://schemas.microsoft.com/office/drawing/2014/main" id="{B27EB1ED-B259-DACE-9B3E-E60C4A109BE4}"/>
+              </a:ext>
+            </a:extLst>
+          </p:cNvPr>
+          <p:cNvCxnSpPr>
+            <a:cxnSpLocks/>
+            <a:stCxn id="21" idx="3"/>
+            <a:endCxn id="6" idx="1"/>
+          </p:cNvCxnSpPr>
+          <p:nvPr/>
+        </p:nvCxnSpPr>
+        <p:spPr>
+          <a:xfrm flipV="1">
+            <a:off x="2907807" y="3136895"/>
+            <a:ext cx="822070" cy="416241"/>
+          </a:xfrm>
+          <a:prstGeom prst="straightConnector1">
+            <a:avLst/>
+          </a:prstGeom>
+          <a:ln w="15875">
+            <a:tailEnd type="triangle" w="lg" len="lg"/>
+          </a:ln>
+        </p:spPr>
+        <p:style>
+          <a:lnRef idx="2">
+            <a:schemeClr val="dk1"/>
+          </a:lnRef>
+          <a:fillRef idx="0">
+            <a:schemeClr val="dk1"/>
+          </a:fillRef>
+          <a:effectRef idx="1">
+            <a:schemeClr val="dk1"/>
+          </a:effectRef>
+          <a:fontRef idx="minor">
+            <a:schemeClr val="tx1"/>
+          </a:fontRef>
+        </p:style>
+      </p:cxnSp>
+      <p:sp>
+        <p:nvSpPr>
+          <p:cNvPr id="124" name="TextBox 123">
+            <a:extLst>
+              <a:ext uri="{FF2B5EF4-FFF2-40B4-BE49-F238E27FC236}">
+                <a16:creationId xmlns:a16="http://schemas.microsoft.com/office/drawing/2014/main" id="{709450CD-C761-904C-8DB1-A28FB820501F}"/>
+              </a:ext>
+            </a:extLst>
+          </p:cNvPr>
+          <p:cNvSpPr txBox="1"/>
+          <p:nvPr/>
+        </p:nvSpPr>
+        <p:spPr>
+          <a:xfrm>
+            <a:off x="3378298" y="3829646"/>
+            <a:ext cx="2245737" cy="369332"/>
+          </a:xfrm>
+          <a:prstGeom prst="rect">
+            <a:avLst/>
+          </a:prstGeom>
+          <a:solidFill>
+            <a:srgbClr val="DAE3F3"/>
+          </a:solidFill>
+          <a:ln>
+            <a:solidFill>
+              <a:schemeClr val="bg2">
+                <a:lumMod val="25000"/>
+              </a:schemeClr>
+            </a:solidFill>
+          </a:ln>
+        </p:spPr>
+        <p:txBody>
+          <a:bodyPr wrap="square" rtlCol="0">
+            <a:spAutoFit/>
+          </a:bodyPr>
+          <a:lstStyle/>
+          <a:p>
+            <a:pPr algn="ctr"/>
+            <a:r>
+              <a:rPr lang="en-CA" dirty="0"/>
+              <a:t>Transcription error</a:t>
+            </a:r>
+            <a:endParaRPr lang="en-US" dirty="0"/>
+          </a:p>
+        </p:txBody>
+      </p:sp>
+      <p:cxnSp>
+        <p:nvCxnSpPr>
+          <p:cNvPr id="127" name="Straight Arrow Connector 126">
+            <a:extLst>
+              <a:ext uri="{FF2B5EF4-FFF2-40B4-BE49-F238E27FC236}">
+                <a16:creationId xmlns:a16="http://schemas.microsoft.com/office/drawing/2014/main" id="{9AFEF128-0F63-3C83-88B9-47512DE4F078}"/>
+              </a:ext>
+            </a:extLst>
+          </p:cNvPr>
+          <p:cNvCxnSpPr>
+            <a:cxnSpLocks/>
+            <a:stCxn id="124" idx="0"/>
+            <a:endCxn id="6" idx="2"/>
+          </p:cNvCxnSpPr>
+          <p:nvPr/>
+        </p:nvCxnSpPr>
+        <p:spPr>
+          <a:xfrm flipV="1">
+            <a:off x="4501167" y="3460060"/>
+            <a:ext cx="497" cy="369586"/>
+          </a:xfrm>
+          <a:prstGeom prst="straightConnector1">
+            <a:avLst/>
+          </a:prstGeom>
+          <a:ln w="15875">
+            <a:tailEnd type="triangle" w="lg" len="lg"/>
+          </a:ln>
+        </p:spPr>
+        <p:style>
+          <a:lnRef idx="2">
+            <a:schemeClr val="dk1"/>
+          </a:lnRef>
+          <a:fillRef idx="0">
+            <a:schemeClr val="dk1"/>
+          </a:fillRef>
+          <a:effectRef idx="1">
+            <a:schemeClr val="dk1"/>
+          </a:effectRef>
+          <a:fontRef idx="minor">
+            <a:schemeClr val="tx1"/>
+          </a:fontRef>
+        </p:style>
+      </p:cxnSp>
+      <p:sp>
+        <p:nvSpPr>
+          <p:cNvPr id="132" name="TextBox 131">
+            <a:extLst>
+              <a:ext uri="{FF2B5EF4-FFF2-40B4-BE49-F238E27FC236}">
+                <a16:creationId xmlns:a16="http://schemas.microsoft.com/office/drawing/2014/main" id="{F10B119E-8265-C5A4-A5B4-1EA03B074C9F}"/>
+              </a:ext>
+            </a:extLst>
+          </p:cNvPr>
+          <p:cNvSpPr txBox="1"/>
+          <p:nvPr/>
+        </p:nvSpPr>
+        <p:spPr>
+          <a:xfrm>
+            <a:off x="3715154" y="2047402"/>
+            <a:ext cx="1543573" cy="369332"/>
+          </a:xfrm>
+          <a:prstGeom prst="rect">
+            <a:avLst/>
+          </a:prstGeom>
+          <a:solidFill>
+            <a:schemeClr val="accent4">
+              <a:lumMod val="20000"/>
+              <a:lumOff val="80000"/>
+            </a:schemeClr>
+          </a:solidFill>
+          <a:ln w="19050">
+            <a:solidFill>
+              <a:schemeClr val="bg2">
+                <a:lumMod val="25000"/>
+              </a:schemeClr>
+            </a:solidFill>
+          </a:ln>
+        </p:spPr>
+        <p:txBody>
+          <a:bodyPr wrap="square" rtlCol="0">
+            <a:spAutoFit/>
+          </a:bodyPr>
+          <a:lstStyle/>
+          <a:p>
+            <a:pPr algn="ctr"/>
+            <a:r>
+              <a:rPr lang="en-CA" dirty="0"/>
+              <a:t>Observed size</a:t>
+            </a:r>
+            <a:endParaRPr lang="en-US" dirty="0"/>
+          </a:p>
+        </p:txBody>
+      </p:sp>
+      <p:sp>
+        <p:nvSpPr>
+          <p:cNvPr id="174" name="TextBox 173">
+            <a:extLst>
+              <a:ext uri="{FF2B5EF4-FFF2-40B4-BE49-F238E27FC236}">
+                <a16:creationId xmlns:a16="http://schemas.microsoft.com/office/drawing/2014/main" id="{B3C7D58D-A375-A029-5D80-0B389F4CBC13}"/>
+              </a:ext>
+            </a:extLst>
+          </p:cNvPr>
+          <p:cNvSpPr txBox="1"/>
+          <p:nvPr/>
+        </p:nvSpPr>
+        <p:spPr>
+          <a:xfrm>
+            <a:off x="3364072" y="1188185"/>
+            <a:ext cx="2245737" cy="369332"/>
+          </a:xfrm>
+          <a:prstGeom prst="rect">
+            <a:avLst/>
+          </a:prstGeom>
+          <a:solidFill>
+            <a:srgbClr val="DAE3F3"/>
+          </a:solidFill>
+          <a:ln>
+            <a:solidFill>
+              <a:schemeClr val="bg2">
+                <a:lumMod val="25000"/>
+              </a:schemeClr>
+            </a:solidFill>
+          </a:ln>
+        </p:spPr>
+        <p:txBody>
+          <a:bodyPr wrap="square" rtlCol="0">
+            <a:spAutoFit/>
+          </a:bodyPr>
+          <a:lstStyle/>
+          <a:p>
+            <a:pPr algn="ctr"/>
+            <a:r>
+              <a:rPr lang="en-CA" dirty="0"/>
+              <a:t>Transcription error</a:t>
+            </a:r>
+            <a:endParaRPr lang="en-US" dirty="0"/>
+          </a:p>
+        </p:txBody>
+      </p:sp>
+      <p:cxnSp>
+        <p:nvCxnSpPr>
+          <p:cNvPr id="175" name="Straight Arrow Connector 174">
+            <a:extLst>
+              <a:ext uri="{FF2B5EF4-FFF2-40B4-BE49-F238E27FC236}">
+                <a16:creationId xmlns:a16="http://schemas.microsoft.com/office/drawing/2014/main" id="{3A3C9B2E-1C9C-1065-311E-3AD9656E1C01}"/>
+              </a:ext>
+            </a:extLst>
+          </p:cNvPr>
+          <p:cNvCxnSpPr>
+            <a:cxnSpLocks/>
+            <a:stCxn id="174" idx="2"/>
+            <a:endCxn id="132" idx="0"/>
+          </p:cNvCxnSpPr>
+          <p:nvPr/>
+        </p:nvCxnSpPr>
+        <p:spPr>
+          <a:xfrm>
+            <a:off x="4486941" y="1557517"/>
+            <a:ext cx="0" cy="489885"/>
+          </a:xfrm>
+          <a:prstGeom prst="straightConnector1">
+            <a:avLst/>
+          </a:prstGeom>
+          <a:ln w="15875">
+            <a:tailEnd type="triangle" w="lg" len="lg"/>
+          </a:ln>
+        </p:spPr>
+        <p:style>
+          <a:lnRef idx="2">
+            <a:schemeClr val="dk1"/>
+          </a:lnRef>
+          <a:fillRef idx="0">
+            <a:schemeClr val="dk1"/>
+          </a:fillRef>
+          <a:effectRef idx="1">
+            <a:schemeClr val="dk1"/>
+          </a:effectRef>
+          <a:fontRef idx="minor">
+            <a:schemeClr val="tx1"/>
+          </a:fontRef>
+        </p:style>
+      </p:cxnSp>
+      <p:cxnSp>
+        <p:nvCxnSpPr>
+          <p:cNvPr id="192" name="Straight Arrow Connector 191">
+            <a:extLst>
+              <a:ext uri="{FF2B5EF4-FFF2-40B4-BE49-F238E27FC236}">
+                <a16:creationId xmlns:a16="http://schemas.microsoft.com/office/drawing/2014/main" id="{B1B1F3AA-2841-F444-34A4-2983E16C45EC}"/>
+              </a:ext>
+            </a:extLst>
+          </p:cNvPr>
+          <p:cNvCxnSpPr>
+            <a:cxnSpLocks/>
+            <a:stCxn id="31" idx="1"/>
+            <a:endCxn id="132" idx="3"/>
+          </p:cNvCxnSpPr>
+          <p:nvPr/>
+        </p:nvCxnSpPr>
+        <p:spPr>
+          <a:xfrm flipH="1">
+            <a:off x="5258727" y="2203808"/>
+            <a:ext cx="2304708" cy="28260"/>
+          </a:xfrm>
+          <a:prstGeom prst="straightConnector1">
+            <a:avLst/>
+          </a:prstGeom>
+          <a:ln w="15875">
+            <a:tailEnd type="triangle" w="lg" len="lg"/>
+          </a:ln>
+        </p:spPr>
+        <p:style>
+          <a:lnRef idx="2">
+            <a:schemeClr val="dk1"/>
+          </a:lnRef>
+          <a:fillRef idx="0">
+            <a:schemeClr val="dk1"/>
+          </a:fillRef>
+          <a:effectRef idx="1">
+            <a:schemeClr val="dk1"/>
+          </a:effectRef>
+          <a:fontRef idx="minor">
+            <a:schemeClr val="tx1"/>
+          </a:fontRef>
+        </p:style>
+      </p:cxnSp>
+      <p:sp>
+        <p:nvSpPr>
+          <p:cNvPr id="200" name="TextBox 199">
+            <a:extLst>
+              <a:ext uri="{FF2B5EF4-FFF2-40B4-BE49-F238E27FC236}">
+                <a16:creationId xmlns:a16="http://schemas.microsoft.com/office/drawing/2014/main" id="{38C446AE-3B05-16DA-0052-C1F139BBB2EB}"/>
+              </a:ext>
+            </a:extLst>
+          </p:cNvPr>
+          <p:cNvSpPr txBox="1"/>
+          <p:nvPr/>
+        </p:nvSpPr>
+        <p:spPr>
+          <a:xfrm>
+            <a:off x="5488574" y="1654920"/>
+            <a:ext cx="1719915" cy="369332"/>
+          </a:xfrm>
+          <a:prstGeom prst="rect">
+            <a:avLst/>
+          </a:prstGeom>
+          <a:solidFill>
+            <a:schemeClr val="accent1">
+              <a:lumMod val="20000"/>
+              <a:lumOff val="80000"/>
+            </a:schemeClr>
+          </a:solidFill>
+          <a:ln>
+            <a:solidFill>
+              <a:schemeClr val="bg2">
+                <a:lumMod val="25000"/>
+              </a:schemeClr>
+            </a:solidFill>
+          </a:ln>
+        </p:spPr>
+        <p:txBody>
+          <a:bodyPr wrap="square" rtlCol="0">
+            <a:spAutoFit/>
+          </a:bodyPr>
+          <a:lstStyle/>
+          <a:p>
+            <a:pPr algn="ctr"/>
+            <a:r>
+              <a:rPr lang="en-CA" dirty="0"/>
+              <a:t>Size precision</a:t>
+            </a:r>
+            <a:endParaRPr lang="en-US" dirty="0"/>
+          </a:p>
+        </p:txBody>
+      </p:sp>
+      <p:cxnSp>
+        <p:nvCxnSpPr>
+          <p:cNvPr id="222" name="Straight Arrow Connector 221">
+            <a:extLst>
+              <a:ext uri="{FF2B5EF4-FFF2-40B4-BE49-F238E27FC236}">
+                <a16:creationId xmlns:a16="http://schemas.microsoft.com/office/drawing/2014/main" id="{77691B5E-9FBC-7158-6B4C-B64E1B302BD5}"/>
+              </a:ext>
+            </a:extLst>
+          </p:cNvPr>
+          <p:cNvCxnSpPr>
+            <a:cxnSpLocks/>
+            <a:stCxn id="200" idx="2"/>
+            <a:endCxn id="132" idx="3"/>
+          </p:cNvCxnSpPr>
+          <p:nvPr/>
+        </p:nvCxnSpPr>
+        <p:spPr>
+          <a:xfrm flipH="1">
+            <a:off x="5258727" y="2024252"/>
+            <a:ext cx="1089805" cy="207816"/>
+          </a:xfrm>
+          <a:prstGeom prst="straightConnector1">
+            <a:avLst/>
+          </a:prstGeom>
+          <a:ln w="15875">
+            <a:tailEnd type="triangle" w="lg" len="lg"/>
+          </a:ln>
+        </p:spPr>
+        <p:style>
+          <a:lnRef idx="2">
+            <a:schemeClr val="dk1"/>
+          </a:lnRef>
+          <a:fillRef idx="0">
+            <a:schemeClr val="dk1"/>
+          </a:fillRef>
+          <a:effectRef idx="1">
+            <a:schemeClr val="dk1"/>
+          </a:effectRef>
+          <a:fontRef idx="minor">
+            <a:schemeClr val="tx1"/>
+          </a:fontRef>
+        </p:style>
+      </p:cxnSp>
+      <p:sp>
+        <p:nvSpPr>
+          <p:cNvPr id="298" name="Rectangle 297">
+            <a:extLst>
+              <a:ext uri="{FF2B5EF4-FFF2-40B4-BE49-F238E27FC236}">
+                <a16:creationId xmlns:a16="http://schemas.microsoft.com/office/drawing/2014/main" id="{C727A8C7-4004-A018-15A4-927901445235}"/>
+              </a:ext>
+            </a:extLst>
+          </p:cNvPr>
+          <p:cNvSpPr/>
+          <p:nvPr/>
+        </p:nvSpPr>
+        <p:spPr>
+          <a:xfrm>
+            <a:off x="7367856" y="1742142"/>
+            <a:ext cx="1451174" cy="1792498"/>
+          </a:xfrm>
+          <a:prstGeom prst="rect">
+            <a:avLst/>
+          </a:prstGeom>
+          <a:solidFill>
+            <a:srgbClr val="C5E0B4">
+              <a:alpha val="26000"/>
+            </a:srgbClr>
+          </a:solidFill>
+        </p:spPr>
+        <p:style>
+          <a:lnRef idx="2">
+            <a:schemeClr val="accent1">
+              <a:shade val="15000"/>
+            </a:schemeClr>
+          </a:lnRef>
+          <a:fillRef idx="1">
+            <a:schemeClr val="accent1"/>
+          </a:fillRef>
+          <a:effectRef idx="0">
+            <a:schemeClr val="accent1"/>
+          </a:effectRef>
+          <a:fontRef idx="minor">
+            <a:schemeClr val="lt1"/>
+          </a:fontRef>
+        </p:style>
+        <p:txBody>
+          <a:bodyPr rtlCol="0" anchor="ctr"/>
+          <a:lstStyle/>
+          <a:p>
+            <a:pPr algn="ctr"/>
+            <a:endParaRPr lang="en-US"/>
+          </a:p>
+        </p:txBody>
+      </p:sp>
     </p:spTree>
     <p:extLst>
       <p:ext uri="{BB962C8B-B14F-4D97-AF65-F5344CB8AC3E}">

</xml_diff>